<commit_message>
m&m updates based on liz comments
</commit_message>
<xml_diff>
--- a/exp1/script/testing/timelineTesting.pptx
+++ b/exp1/script/testing/timelineTesting.pptx
@@ -7,7 +7,8 @@
   <p:sldIdLst>
     <p:sldId id="256" r:id="rId2"/>
     <p:sldId id="257" r:id="rId3"/>
-    <p:sldId id="258" r:id="rId4"/>
+    <p:sldId id="259" r:id="rId4"/>
+    <p:sldId id="258" r:id="rId5"/>
   </p:sldIdLst>
   <p:sldSz cx="12192000" cy="6858000"/>
   <p:notesSz cx="6858000" cy="9144000"/>
@@ -263,7 +264,7 @@
           <a:p>
             <a:fld id="{B1B915C8-2E81-429A-BD90-45E424FDD57F}" type="datetimeFigureOut">
               <a:rPr lang="en-GB" smtClean="0"/>
-              <a:t>28/03/2020</a:t>
+              <a:t>30/03/2020</a:t>
             </a:fld>
             <a:endParaRPr lang="en-GB"/>
           </a:p>
@@ -463,7 +464,7 @@
           <a:p>
             <a:fld id="{B1B915C8-2E81-429A-BD90-45E424FDD57F}" type="datetimeFigureOut">
               <a:rPr lang="en-GB" smtClean="0"/>
-              <a:t>28/03/2020</a:t>
+              <a:t>30/03/2020</a:t>
             </a:fld>
             <a:endParaRPr lang="en-GB"/>
           </a:p>
@@ -673,7 +674,7 @@
           <a:p>
             <a:fld id="{B1B915C8-2E81-429A-BD90-45E424FDD57F}" type="datetimeFigureOut">
               <a:rPr lang="en-GB" smtClean="0"/>
-              <a:t>28/03/2020</a:t>
+              <a:t>30/03/2020</a:t>
             </a:fld>
             <a:endParaRPr lang="en-GB"/>
           </a:p>
@@ -873,7 +874,7 @@
           <a:p>
             <a:fld id="{B1B915C8-2E81-429A-BD90-45E424FDD57F}" type="datetimeFigureOut">
               <a:rPr lang="en-GB" smtClean="0"/>
-              <a:t>28/03/2020</a:t>
+              <a:t>30/03/2020</a:t>
             </a:fld>
             <a:endParaRPr lang="en-GB"/>
           </a:p>
@@ -1149,7 +1150,7 @@
           <a:p>
             <a:fld id="{B1B915C8-2E81-429A-BD90-45E424FDD57F}" type="datetimeFigureOut">
               <a:rPr lang="en-GB" smtClean="0"/>
-              <a:t>28/03/2020</a:t>
+              <a:t>30/03/2020</a:t>
             </a:fld>
             <a:endParaRPr lang="en-GB"/>
           </a:p>
@@ -1417,7 +1418,7 @@
           <a:p>
             <a:fld id="{B1B915C8-2E81-429A-BD90-45E424FDD57F}" type="datetimeFigureOut">
               <a:rPr lang="en-GB" smtClean="0"/>
-              <a:t>28/03/2020</a:t>
+              <a:t>30/03/2020</a:t>
             </a:fld>
             <a:endParaRPr lang="en-GB"/>
           </a:p>
@@ -1832,7 +1833,7 @@
           <a:p>
             <a:fld id="{B1B915C8-2E81-429A-BD90-45E424FDD57F}" type="datetimeFigureOut">
               <a:rPr lang="en-GB" smtClean="0"/>
-              <a:t>28/03/2020</a:t>
+              <a:t>30/03/2020</a:t>
             </a:fld>
             <a:endParaRPr lang="en-GB"/>
           </a:p>
@@ -1974,7 +1975,7 @@
           <a:p>
             <a:fld id="{B1B915C8-2E81-429A-BD90-45E424FDD57F}" type="datetimeFigureOut">
               <a:rPr lang="en-GB" smtClean="0"/>
-              <a:t>28/03/2020</a:t>
+              <a:t>30/03/2020</a:t>
             </a:fld>
             <a:endParaRPr lang="en-GB"/>
           </a:p>
@@ -2087,7 +2088,7 @@
           <a:p>
             <a:fld id="{B1B915C8-2E81-429A-BD90-45E424FDD57F}" type="datetimeFigureOut">
               <a:rPr lang="en-GB" smtClean="0"/>
-              <a:t>28/03/2020</a:t>
+              <a:t>30/03/2020</a:t>
             </a:fld>
             <a:endParaRPr lang="en-GB"/>
           </a:p>
@@ -2400,7 +2401,7 @@
           <a:p>
             <a:fld id="{B1B915C8-2E81-429A-BD90-45E424FDD57F}" type="datetimeFigureOut">
               <a:rPr lang="en-GB" smtClean="0"/>
-              <a:t>28/03/2020</a:t>
+              <a:t>30/03/2020</a:t>
             </a:fld>
             <a:endParaRPr lang="en-GB"/>
           </a:p>
@@ -2689,7 +2690,7 @@
           <a:p>
             <a:fld id="{B1B915C8-2E81-429A-BD90-45E424FDD57F}" type="datetimeFigureOut">
               <a:rPr lang="en-GB" smtClean="0"/>
-              <a:t>28/03/2020</a:t>
+              <a:t>30/03/2020</a:t>
             </a:fld>
             <a:endParaRPr lang="en-GB"/>
           </a:p>
@@ -2932,7 +2933,7 @@
           <a:p>
             <a:fld id="{B1B915C8-2E81-429A-BD90-45E424FDD57F}" type="datetimeFigureOut">
               <a:rPr lang="en-GB" smtClean="0"/>
-              <a:t>28/03/2020</a:t>
+              <a:t>30/03/2020</a:t>
             </a:fld>
             <a:endParaRPr lang="en-GB"/>
           </a:p>
@@ -4483,8 +4484,8 @@
         </p:nvSpPr>
         <p:spPr>
           <a:xfrm>
-            <a:off x="6724535" y="1957173"/>
-            <a:ext cx="4107990" cy="954107"/>
+            <a:off x="6808039" y="1667324"/>
+            <a:ext cx="4740113" cy="954107"/>
           </a:xfrm>
           <a:prstGeom prst="rect">
             <a:avLst/>
@@ -4509,13 +4510,27 @@
                 <a:latin typeface="Arial" panose="020B0604020202020204" pitchFamily="34" charset="0"/>
                 <a:cs typeface="Arial" panose="020B0604020202020204" pitchFamily="34" charset="0"/>
               </a:rPr>
-              <a:t>much</a:t>
+              <a:t>well</a:t>
             </a:r>
             <a:r>
               <a:rPr lang="it-IT" sz="2800" i="1" dirty="0">
                 <a:latin typeface="Arial" panose="020B0604020202020204" pitchFamily="34" charset="0"/>
                 <a:cs typeface="Arial" panose="020B0604020202020204" pitchFamily="34" charset="0"/>
               </a:rPr>
+              <a:t> do </a:t>
+            </a:r>
+            <a:r>
+              <a:rPr lang="it-IT" sz="2800" i="1" dirty="0" err="1">
+                <a:latin typeface="Arial" panose="020B0604020202020204" pitchFamily="34" charset="0"/>
+                <a:cs typeface="Arial" panose="020B0604020202020204" pitchFamily="34" charset="0"/>
+              </a:rPr>
+              <a:t>you</a:t>
+            </a:r>
+            <a:r>
+              <a:rPr lang="it-IT" sz="2800" i="1" dirty="0">
+                <a:latin typeface="Arial" panose="020B0604020202020204" pitchFamily="34" charset="0"/>
+                <a:cs typeface="Arial" panose="020B0604020202020204" pitchFamily="34" charset="0"/>
+              </a:rPr>
               <a:t> </a:t>
             </a:r>
             <a:r>
@@ -4523,27 +4538,55 @@
                 <a:latin typeface="Arial" panose="020B0604020202020204" pitchFamily="34" charset="0"/>
                 <a:cs typeface="Arial" panose="020B0604020202020204" pitchFamily="34" charset="0"/>
               </a:rPr>
-              <a:t>likely</a:t>
+              <a:t>think</a:t>
             </a:r>
             <a:r>
               <a:rPr lang="it-IT" sz="2800" i="1" dirty="0">
                 <a:latin typeface="Arial" panose="020B0604020202020204" pitchFamily="34" charset="0"/>
                 <a:cs typeface="Arial" panose="020B0604020202020204" pitchFamily="34" charset="0"/>
               </a:rPr>
-              <a:t> do </a:t>
+              <a:t> </a:t>
             </a:r>
             <a:r>
               <a:rPr lang="it-IT" sz="2800" i="1" dirty="0" err="1">
                 <a:latin typeface="Arial" panose="020B0604020202020204" pitchFamily="34" charset="0"/>
                 <a:cs typeface="Arial" panose="020B0604020202020204" pitchFamily="34" charset="0"/>
               </a:rPr>
-              <a:t>you</a:t>
+              <a:t>this</a:t>
             </a:r>
             <a:r>
               <a:rPr lang="it-IT" sz="2800" i="1" dirty="0">
                 <a:latin typeface="Arial" panose="020B0604020202020204" pitchFamily="34" charset="0"/>
                 <a:cs typeface="Arial" panose="020B0604020202020204" pitchFamily="34" charset="0"/>
               </a:rPr>
+              <a:t> label </a:t>
+            </a:r>
+            <a:r>
+              <a:rPr lang="it-IT" sz="2800" i="1" dirty="0" err="1">
+                <a:latin typeface="Arial" panose="020B0604020202020204" pitchFamily="34" charset="0"/>
+                <a:cs typeface="Arial" panose="020B0604020202020204" pitchFamily="34" charset="0"/>
+              </a:rPr>
+              <a:t>goes</a:t>
+            </a:r>
+            <a:r>
+              <a:rPr lang="it-IT" sz="2800" i="1" dirty="0">
+                <a:latin typeface="Arial" panose="020B0604020202020204" pitchFamily="34" charset="0"/>
+                <a:cs typeface="Arial" panose="020B0604020202020204" pitchFamily="34" charset="0"/>
+              </a:rPr>
+              <a:t> with </a:t>
+            </a:r>
+            <a:r>
+              <a:rPr lang="it-IT" sz="2800" i="1" dirty="0" err="1">
+                <a:latin typeface="Arial" panose="020B0604020202020204" pitchFamily="34" charset="0"/>
+                <a:cs typeface="Arial" panose="020B0604020202020204" pitchFamily="34" charset="0"/>
+              </a:rPr>
+              <a:t>this</a:t>
+            </a:r>
+            <a:r>
+              <a:rPr lang="it-IT" sz="2800" i="1" dirty="0">
+                <a:latin typeface="Arial" panose="020B0604020202020204" pitchFamily="34" charset="0"/>
+                <a:cs typeface="Arial" panose="020B0604020202020204" pitchFamily="34" charset="0"/>
+              </a:rPr>
               <a:t> </a:t>
             </a:r>
             <a:r>
@@ -4551,42 +4594,14 @@
                 <a:latin typeface="Arial" panose="020B0604020202020204" pitchFamily="34" charset="0"/>
                 <a:cs typeface="Arial" panose="020B0604020202020204" pitchFamily="34" charset="0"/>
               </a:rPr>
-              <a:t>think</a:t>
+              <a:t>fribble</a:t>
             </a:r>
             <a:r>
               <a:rPr lang="it-IT" sz="2800" i="1" dirty="0">
                 <a:latin typeface="Arial" panose="020B0604020202020204" pitchFamily="34" charset="0"/>
                 <a:cs typeface="Arial" panose="020B0604020202020204" pitchFamily="34" charset="0"/>
               </a:rPr>
-              <a:t> </a:t>
-            </a:r>
-            <a:r>
-              <a:rPr lang="it-IT" sz="2800" i="1" dirty="0" err="1">
-                <a:latin typeface="Arial" panose="020B0604020202020204" pitchFamily="34" charset="0"/>
-                <a:cs typeface="Arial" panose="020B0604020202020204" pitchFamily="34" charset="0"/>
-              </a:rPr>
-              <a:t>it’s</a:t>
-            </a:r>
-            <a:r>
-              <a:rPr lang="it-IT" sz="2800" i="1" dirty="0">
-                <a:latin typeface="Arial" panose="020B0604020202020204" pitchFamily="34" charset="0"/>
-                <a:cs typeface="Arial" panose="020B0604020202020204" pitchFamily="34" charset="0"/>
-              </a:rPr>
-              <a:t> </a:t>
-            </a:r>
-            <a:r>
-              <a:rPr lang="it-IT" sz="2800" i="1" dirty="0" err="1">
-                <a:latin typeface="Arial" panose="020B0604020202020204" pitchFamily="34" charset="0"/>
-                <a:cs typeface="Arial" panose="020B0604020202020204" pitchFamily="34" charset="0"/>
-              </a:rPr>
-              <a:t>his</a:t>
-            </a:r>
-            <a:r>
-              <a:rPr lang="it-IT" sz="2800" i="1" dirty="0">
-                <a:latin typeface="Arial" panose="020B0604020202020204" pitchFamily="34" charset="0"/>
-                <a:cs typeface="Arial" panose="020B0604020202020204" pitchFamily="34" charset="0"/>
-              </a:rPr>
-              <a:t> name?»</a:t>
+              <a:t>?»</a:t>
             </a:r>
             <a:endParaRPr lang="en-GB" sz="2800" i="1" dirty="0">
               <a:latin typeface="Arial" panose="020B0604020202020204" pitchFamily="34" charset="0"/>
@@ -4640,7 +4655,7 @@
         <p:spPr>
           <a:xfrm>
             <a:off x="2532818" y="131021"/>
-            <a:ext cx="6858000" cy="584775"/>
+            <a:ext cx="6858000" cy="954107"/>
           </a:xfrm>
           <a:prstGeom prst="rect">
             <a:avLst/>
@@ -4659,8 +4674,22 @@
                 <a:latin typeface="Arial" panose="020B0604020202020204" pitchFamily="34" charset="0"/>
                 <a:cs typeface="Arial" panose="020B0604020202020204" pitchFamily="34" charset="0"/>
               </a:rPr>
-              <a:t>Generalization task</a:t>
-            </a:r>
+              <a:t>Generalization tasks</a:t>
+            </a:r>
+          </a:p>
+          <a:p>
+            <a:pPr algn="ctr"/>
+            <a:r>
+              <a:rPr lang="en-GB" sz="2400" dirty="0">
+                <a:latin typeface="Arial" panose="020B0604020202020204" pitchFamily="34" charset="0"/>
+                <a:cs typeface="Arial" panose="020B0604020202020204" pitchFamily="34" charset="0"/>
+              </a:rPr>
+              <a:t>High frequency exemplars</a:t>
+            </a:r>
+            <a:endParaRPr lang="en-GB" sz="3200" dirty="0">
+              <a:latin typeface="Arial" panose="020B0604020202020204" pitchFamily="34" charset="0"/>
+              <a:cs typeface="Arial" panose="020B0604020202020204" pitchFamily="34" charset="0"/>
+            </a:endParaRPr>
           </a:p>
         </p:txBody>
       </p:sp>
@@ -4678,7 +4707,7 @@
         </p:nvSpPr>
         <p:spPr>
           <a:xfrm>
-            <a:off x="2579229" y="1028519"/>
+            <a:off x="318918" y="1367566"/>
             <a:ext cx="1981057" cy="1500668"/>
           </a:xfrm>
           <a:prstGeom prst="roundRect">
@@ -4748,7 +4777,7 @@
         </p:nvSpPr>
         <p:spPr>
           <a:xfrm>
-            <a:off x="6074922" y="4001739"/>
+            <a:off x="2939533" y="4348651"/>
             <a:ext cx="1293558" cy="400110"/>
           </a:xfrm>
           <a:prstGeom prst="rect">
@@ -4797,7 +4826,7 @@
         </p:nvSpPr>
         <p:spPr>
           <a:xfrm>
-            <a:off x="8031318" y="5184978"/>
+            <a:off x="4086153" y="5594821"/>
             <a:ext cx="3087942" cy="400110"/>
           </a:xfrm>
           <a:prstGeom prst="rect">
@@ -4851,8 +4880,8 @@
         </p:nvCxnSpPr>
         <p:spPr>
           <a:xfrm>
-            <a:off x="2530475" y="2546491"/>
-            <a:ext cx="5381181" cy="2782838"/>
+            <a:off x="318918" y="3227594"/>
+            <a:ext cx="4088692" cy="2885531"/>
           </a:xfrm>
           <a:prstGeom prst="straightConnector1">
             <a:avLst/>
@@ -4893,7 +4922,7 @@
         </p:nvSpPr>
         <p:spPr>
           <a:xfrm>
-            <a:off x="3052923" y="2507294"/>
+            <a:off x="792612" y="2846341"/>
             <a:ext cx="1293558" cy="400110"/>
           </a:xfrm>
           <a:prstGeom prst="rect">
@@ -4942,8 +4971,8 @@
         </p:nvSpPr>
         <p:spPr>
           <a:xfrm>
-            <a:off x="4145916" y="2094529"/>
-            <a:ext cx="4254523" cy="1856067"/>
+            <a:off x="1885606" y="2433576"/>
+            <a:ext cx="3135820" cy="1856067"/>
           </a:xfrm>
           <a:prstGeom prst="roundRect">
             <a:avLst/>
@@ -5010,7 +5039,7 @@
         </p:blipFill>
         <p:spPr>
           <a:xfrm>
-            <a:off x="4364246" y="2631806"/>
+            <a:off x="1970373" y="3145511"/>
             <a:ext cx="1040940" cy="856499"/>
           </a:xfrm>
           <a:prstGeom prst="rect">
@@ -5032,7 +5061,7 @@
         </p:nvGrpSpPr>
         <p:grpSpPr>
           <a:xfrm>
-            <a:off x="4346481" y="2222258"/>
+            <a:off x="2086170" y="2561305"/>
             <a:ext cx="534256" cy="485091"/>
             <a:chOff x="439547" y="2285573"/>
             <a:chExt cx="1136114" cy="1278743"/>
@@ -5158,7 +5187,7 @@
         </p:nvSpPr>
         <p:spPr>
           <a:xfrm>
-            <a:off x="4871022" y="2086762"/>
+            <a:off x="2610711" y="2425809"/>
             <a:ext cx="1267973" cy="584775"/>
           </a:xfrm>
           <a:prstGeom prst="rect">
@@ -5177,7 +5206,7 @@
                 <a:latin typeface="Arial" panose="020B0604020202020204" pitchFamily="34" charset="0"/>
                 <a:cs typeface="Arial" panose="020B0604020202020204" pitchFamily="34" charset="0"/>
               </a:rPr>
-              <a:t>keeb</a:t>
+              <a:t>wug</a:t>
             </a:r>
             <a:endParaRPr lang="en-GB" sz="3200" dirty="0">
               <a:latin typeface="Arial" panose="020B0604020202020204" pitchFamily="34" charset="0"/>
@@ -5200,7 +5229,7 @@
         </p:nvSpPr>
         <p:spPr>
           <a:xfrm>
-            <a:off x="7834237" y="3609852"/>
+            <a:off x="4322191" y="4019695"/>
             <a:ext cx="1981057" cy="1500668"/>
           </a:xfrm>
           <a:prstGeom prst="roundRect">
@@ -5260,7 +5289,7 @@
         </p:nvSpPr>
         <p:spPr>
           <a:xfrm>
-            <a:off x="4613609" y="1144363"/>
+            <a:off x="2454146" y="1452337"/>
             <a:ext cx="3783806" cy="830997"/>
           </a:xfrm>
           <a:prstGeom prst="rect">
@@ -5314,7 +5343,7 @@
                 <a:latin typeface="Arial" panose="020B0604020202020204" pitchFamily="34" charset="0"/>
                 <a:cs typeface="Arial" panose="020B0604020202020204" pitchFamily="34" charset="0"/>
               </a:rPr>
-              <a:t>name</a:t>
+              <a:t>label</a:t>
             </a:r>
             <a:r>
               <a:rPr lang="it-IT" sz="2400" i="1" dirty="0">
@@ -5332,10 +5361,10 @@
       </p:sp>
       <p:pic>
         <p:nvPicPr>
-          <p:cNvPr id="29" name="Picture 28">
-            <a:extLst>
-              <a:ext uri="{FF2B5EF4-FFF2-40B4-BE49-F238E27FC236}">
-                <a16:creationId xmlns:a16="http://schemas.microsoft.com/office/drawing/2014/main" id="{0E207948-3620-4660-AB5D-495A9373849B}"/>
+          <p:cNvPr id="2" name="Picture 1">
+            <a:extLst>
+              <a:ext uri="{FF2B5EF4-FFF2-40B4-BE49-F238E27FC236}">
+                <a16:creationId xmlns:a16="http://schemas.microsoft.com/office/drawing/2014/main" id="{6A5F4129-102E-4366-B8B5-42D31878ED42}"/>
               </a:ext>
             </a:extLst>
           </p:cNvPr>
@@ -5344,15 +5373,16 @@
           </p:cNvPicPr>
           <p:nvPr/>
         </p:nvPicPr>
-        <p:blipFill rotWithShape="1">
+        <p:blipFill>
           <a:blip r:embed="rId3"/>
-          <a:srcRect l="9421"/>
-          <a:stretch/>
+          <a:stretch>
+            <a:fillRect/>
+          </a:stretch>
         </p:blipFill>
         <p:spPr>
           <a:xfrm>
-            <a:off x="5331304" y="2573753"/>
-            <a:ext cx="1098646" cy="927148"/>
+            <a:off x="2939534" y="3145510"/>
+            <a:ext cx="1164774" cy="940953"/>
           </a:xfrm>
           <a:prstGeom prst="rect">
             <a:avLst/>
@@ -5361,10 +5391,10 @@
       </p:pic>
       <p:pic>
         <p:nvPicPr>
-          <p:cNvPr id="30" name="Picture 29">
-            <a:extLst>
-              <a:ext uri="{FF2B5EF4-FFF2-40B4-BE49-F238E27FC236}">
-                <a16:creationId xmlns:a16="http://schemas.microsoft.com/office/drawing/2014/main" id="{85984977-6355-449D-8EA0-90BCCF426976}"/>
+          <p:cNvPr id="3" name="Picture 2">
+            <a:extLst>
+              <a:ext uri="{FF2B5EF4-FFF2-40B4-BE49-F238E27FC236}">
+                <a16:creationId xmlns:a16="http://schemas.microsoft.com/office/drawing/2014/main" id="{4A74CDB1-F637-4872-8F06-D4F097B16EF0}"/>
               </a:ext>
             </a:extLst>
           </p:cNvPr>
@@ -5373,27 +5403,580 @@
           </p:cNvPicPr>
           <p:nvPr/>
         </p:nvPicPr>
-        <p:blipFill rotWithShape="1">
+        <p:blipFill>
           <a:blip r:embed="rId4"/>
-          <a:srcRect l="9017" r="11620"/>
-          <a:stretch/>
+          <a:stretch>
+            <a:fillRect/>
+          </a:stretch>
         </p:blipFill>
         <p:spPr>
           <a:xfrm>
-            <a:off x="6363275" y="2463263"/>
-            <a:ext cx="957568" cy="1016052"/>
+            <a:off x="4038636" y="3051353"/>
+            <a:ext cx="956679" cy="940953"/>
           </a:xfrm>
           <a:prstGeom prst="rect">
             <a:avLst/>
           </a:prstGeom>
         </p:spPr>
       </p:pic>
+      <p:sp>
+        <p:nvSpPr>
+          <p:cNvPr id="23" name="Rectangle: Rounded Corners 22">
+            <a:extLst>
+              <a:ext uri="{FF2B5EF4-FFF2-40B4-BE49-F238E27FC236}">
+                <a16:creationId xmlns:a16="http://schemas.microsoft.com/office/drawing/2014/main" id="{58183BED-25DD-49D6-A5C1-14B6ED554954}"/>
+              </a:ext>
+            </a:extLst>
+          </p:cNvPr>
+          <p:cNvSpPr/>
+          <p:nvPr/>
+        </p:nvSpPr>
+        <p:spPr>
+          <a:xfrm>
+            <a:off x="6019373" y="1427501"/>
+            <a:ext cx="1981057" cy="1500668"/>
+          </a:xfrm>
+          <a:prstGeom prst="roundRect">
+            <a:avLst/>
+          </a:prstGeom>
+          <a:solidFill>
+            <a:schemeClr val="bg1"/>
+          </a:solidFill>
+          <a:ln w="28575">
+            <a:solidFill>
+              <a:schemeClr val="tx1"/>
+            </a:solidFill>
+          </a:ln>
+        </p:spPr>
+        <p:style>
+          <a:lnRef idx="2">
+            <a:schemeClr val="accent1">
+              <a:shade val="50000"/>
+            </a:schemeClr>
+          </a:lnRef>
+          <a:fillRef idx="1">
+            <a:schemeClr val="accent1"/>
+          </a:fillRef>
+          <a:effectRef idx="0">
+            <a:schemeClr val="accent1"/>
+          </a:effectRef>
+          <a:fontRef idx="minor">
+            <a:schemeClr val="lt1"/>
+          </a:fontRef>
+        </p:style>
+        <p:txBody>
+          <a:bodyPr rtlCol="0" anchor="ctr"/>
+          <a:lstStyle/>
+          <a:p>
+            <a:pPr algn="ctr"/>
+            <a:r>
+              <a:rPr lang="it-IT" sz="3200" dirty="0">
+                <a:solidFill>
+                  <a:schemeClr val="tx1"/>
+                </a:solidFill>
+                <a:latin typeface="Arial" panose="020B0604020202020204" pitchFamily="34" charset="0"/>
+                <a:cs typeface="Arial" panose="020B0604020202020204" pitchFamily="34" charset="0"/>
+              </a:rPr>
+              <a:t>+</a:t>
+            </a:r>
+            <a:endParaRPr lang="en-GB" sz="3200" dirty="0">
+              <a:solidFill>
+                <a:schemeClr val="tx1"/>
+              </a:solidFill>
+              <a:latin typeface="Arial" panose="020B0604020202020204" pitchFamily="34" charset="0"/>
+              <a:cs typeface="Arial" panose="020B0604020202020204" pitchFamily="34" charset="0"/>
+            </a:endParaRPr>
+          </a:p>
+        </p:txBody>
+      </p:sp>
+      <p:sp>
+        <p:nvSpPr>
+          <p:cNvPr id="24" name="CasellaDiTesto 28">
+            <a:extLst>
+              <a:ext uri="{FF2B5EF4-FFF2-40B4-BE49-F238E27FC236}">
+                <a16:creationId xmlns:a16="http://schemas.microsoft.com/office/drawing/2014/main" id="{52252317-111E-4956-B35A-F2889EFD5A16}"/>
+              </a:ext>
+            </a:extLst>
+          </p:cNvPr>
+          <p:cNvSpPr txBox="1"/>
+          <p:nvPr/>
+        </p:nvSpPr>
+        <p:spPr>
+          <a:xfrm>
+            <a:off x="8639988" y="4408586"/>
+            <a:ext cx="1293558" cy="400110"/>
+          </a:xfrm>
+          <a:prstGeom prst="rect">
+            <a:avLst/>
+          </a:prstGeom>
+          <a:noFill/>
+        </p:spPr>
+        <p:txBody>
+          <a:bodyPr wrap="square" rtlCol="0">
+            <a:spAutoFit/>
+          </a:bodyPr>
+          <a:lstStyle/>
+          <a:p>
+            <a:r>
+              <a:rPr lang="en-GB" sz="2000" dirty="0">
+                <a:latin typeface="Arial" panose="020B0604020202020204" pitchFamily="34" charset="0"/>
+                <a:cs typeface="Arial" panose="020B0604020202020204" pitchFamily="34" charset="0"/>
+              </a:rPr>
+              <a:t>3500 </a:t>
+            </a:r>
+            <a:r>
+              <a:rPr lang="en-GB" sz="2000" dirty="0" err="1">
+                <a:latin typeface="Arial" panose="020B0604020202020204" pitchFamily="34" charset="0"/>
+                <a:cs typeface="Arial" panose="020B0604020202020204" pitchFamily="34" charset="0"/>
+              </a:rPr>
+              <a:t>ms</a:t>
+            </a:r>
+            <a:endParaRPr lang="en-GB" sz="2000" dirty="0">
+              <a:latin typeface="Arial" panose="020B0604020202020204" pitchFamily="34" charset="0"/>
+              <a:cs typeface="Arial" panose="020B0604020202020204" pitchFamily="34" charset="0"/>
+            </a:endParaRPr>
+          </a:p>
+        </p:txBody>
+      </p:sp>
+      <p:sp>
+        <p:nvSpPr>
+          <p:cNvPr id="25" name="CasellaDiTesto 28">
+            <a:extLst>
+              <a:ext uri="{FF2B5EF4-FFF2-40B4-BE49-F238E27FC236}">
+                <a16:creationId xmlns:a16="http://schemas.microsoft.com/office/drawing/2014/main" id="{BD90D6BB-9F92-4F98-B0C0-7816BBCABD90}"/>
+              </a:ext>
+            </a:extLst>
+          </p:cNvPr>
+          <p:cNvSpPr txBox="1"/>
+          <p:nvPr/>
+        </p:nvSpPr>
+        <p:spPr>
+          <a:xfrm>
+            <a:off x="9506149" y="5735070"/>
+            <a:ext cx="2996629" cy="400110"/>
+          </a:xfrm>
+          <a:prstGeom prst="rect">
+            <a:avLst/>
+          </a:prstGeom>
+          <a:noFill/>
+        </p:spPr>
+        <p:txBody>
+          <a:bodyPr wrap="square" rtlCol="0">
+            <a:spAutoFit/>
+          </a:bodyPr>
+          <a:lstStyle/>
+          <a:p>
+            <a:r>
+              <a:rPr lang="en-GB" sz="2000" dirty="0">
+                <a:latin typeface="Arial" panose="020B0604020202020204" pitchFamily="34" charset="0"/>
+                <a:cs typeface="Arial" panose="020B0604020202020204" pitchFamily="34" charset="0"/>
+              </a:rPr>
+              <a:t>1000 </a:t>
+            </a:r>
+            <a:r>
+              <a:rPr lang="en-GB" sz="2000" dirty="0" err="1">
+                <a:latin typeface="Arial" panose="020B0604020202020204" pitchFamily="34" charset="0"/>
+                <a:cs typeface="Arial" panose="020B0604020202020204" pitchFamily="34" charset="0"/>
+              </a:rPr>
+              <a:t>ms</a:t>
+            </a:r>
+            <a:r>
+              <a:rPr lang="en-GB" sz="2000" dirty="0">
+                <a:latin typeface="Arial" panose="020B0604020202020204" pitchFamily="34" charset="0"/>
+                <a:cs typeface="Arial" panose="020B0604020202020204" pitchFamily="34" charset="0"/>
+              </a:rPr>
+              <a:t> + random ISI </a:t>
+            </a:r>
+          </a:p>
+        </p:txBody>
+      </p:sp>
+      <p:cxnSp>
+        <p:nvCxnSpPr>
+          <p:cNvPr id="26" name="Connettore 2 32">
+            <a:extLst>
+              <a:ext uri="{FF2B5EF4-FFF2-40B4-BE49-F238E27FC236}">
+                <a16:creationId xmlns:a16="http://schemas.microsoft.com/office/drawing/2014/main" id="{A8CB6DDE-95DD-4863-9875-8D8294B910FC}"/>
+              </a:ext>
+            </a:extLst>
+          </p:cNvPr>
+          <p:cNvCxnSpPr>
+            <a:cxnSpLocks/>
+          </p:cNvCxnSpPr>
+          <p:nvPr/>
+        </p:nvCxnSpPr>
+        <p:spPr>
+          <a:xfrm>
+            <a:off x="5888006" y="3463537"/>
+            <a:ext cx="4088692" cy="2885531"/>
+          </a:xfrm>
+          <a:prstGeom prst="straightConnector1">
+            <a:avLst/>
+          </a:prstGeom>
+          <a:ln w="38100">
+            <a:solidFill>
+              <a:srgbClr val="FF0000"/>
+            </a:solidFill>
+            <a:tailEnd type="arrow"/>
+          </a:ln>
+        </p:spPr>
+        <p:style>
+          <a:lnRef idx="2">
+            <a:schemeClr val="dk1"/>
+          </a:lnRef>
+          <a:fillRef idx="0">
+            <a:schemeClr val="dk1"/>
+          </a:fillRef>
+          <a:effectRef idx="1">
+            <a:schemeClr val="dk1"/>
+          </a:effectRef>
+          <a:fontRef idx="minor">
+            <a:schemeClr val="tx1"/>
+          </a:fontRef>
+        </p:style>
+      </p:cxnSp>
+      <p:sp>
+        <p:nvSpPr>
+          <p:cNvPr id="27" name="CasellaDiTesto 28">
+            <a:extLst>
+              <a:ext uri="{FF2B5EF4-FFF2-40B4-BE49-F238E27FC236}">
+                <a16:creationId xmlns:a16="http://schemas.microsoft.com/office/drawing/2014/main" id="{D6E73E61-8D94-450A-8CB0-91FA6B312F75}"/>
+              </a:ext>
+            </a:extLst>
+          </p:cNvPr>
+          <p:cNvSpPr txBox="1"/>
+          <p:nvPr/>
+        </p:nvSpPr>
+        <p:spPr>
+          <a:xfrm>
+            <a:off x="6493067" y="2906276"/>
+            <a:ext cx="1293558" cy="400110"/>
+          </a:xfrm>
+          <a:prstGeom prst="rect">
+            <a:avLst/>
+          </a:prstGeom>
+          <a:noFill/>
+        </p:spPr>
+        <p:txBody>
+          <a:bodyPr wrap="square" rtlCol="0">
+            <a:spAutoFit/>
+          </a:bodyPr>
+          <a:lstStyle/>
+          <a:p>
+            <a:r>
+              <a:rPr lang="en-GB" sz="2000" dirty="0">
+                <a:latin typeface="Arial" panose="020B0604020202020204" pitchFamily="34" charset="0"/>
+                <a:cs typeface="Arial" panose="020B0604020202020204" pitchFamily="34" charset="0"/>
+              </a:rPr>
+              <a:t>500 </a:t>
+            </a:r>
+            <a:r>
+              <a:rPr lang="en-GB" sz="2000" dirty="0" err="1">
+                <a:latin typeface="Arial" panose="020B0604020202020204" pitchFamily="34" charset="0"/>
+                <a:cs typeface="Arial" panose="020B0604020202020204" pitchFamily="34" charset="0"/>
+              </a:rPr>
+              <a:t>ms</a:t>
+            </a:r>
+            <a:endParaRPr lang="en-GB" sz="2000" dirty="0">
+              <a:latin typeface="Arial" panose="020B0604020202020204" pitchFamily="34" charset="0"/>
+              <a:cs typeface="Arial" panose="020B0604020202020204" pitchFamily="34" charset="0"/>
+            </a:endParaRPr>
+          </a:p>
+        </p:txBody>
+      </p:sp>
+      <p:sp>
+        <p:nvSpPr>
+          <p:cNvPr id="32" name="Rectangle: Rounded Corners 31">
+            <a:extLst>
+              <a:ext uri="{FF2B5EF4-FFF2-40B4-BE49-F238E27FC236}">
+                <a16:creationId xmlns:a16="http://schemas.microsoft.com/office/drawing/2014/main" id="{652A054E-77B7-4305-BFA5-2D5076BB06BE}"/>
+              </a:ext>
+            </a:extLst>
+          </p:cNvPr>
+          <p:cNvSpPr/>
+          <p:nvPr/>
+        </p:nvSpPr>
+        <p:spPr>
+          <a:xfrm>
+            <a:off x="7586061" y="2493511"/>
+            <a:ext cx="3109709" cy="1856067"/>
+          </a:xfrm>
+          <a:prstGeom prst="roundRect">
+            <a:avLst/>
+          </a:prstGeom>
+          <a:solidFill>
+            <a:schemeClr val="bg1"/>
+          </a:solidFill>
+          <a:ln w="28575">
+            <a:solidFill>
+              <a:schemeClr val="tx1"/>
+            </a:solidFill>
+          </a:ln>
+        </p:spPr>
+        <p:style>
+          <a:lnRef idx="2">
+            <a:schemeClr val="accent1">
+              <a:shade val="50000"/>
+            </a:schemeClr>
+          </a:lnRef>
+          <a:fillRef idx="1">
+            <a:schemeClr val="accent1"/>
+          </a:fillRef>
+          <a:effectRef idx="0">
+            <a:schemeClr val="accent1"/>
+          </a:effectRef>
+          <a:fontRef idx="minor">
+            <a:schemeClr val="lt1"/>
+          </a:fontRef>
+        </p:style>
+        <p:txBody>
+          <a:bodyPr rtlCol="0" anchor="ctr"/>
+          <a:lstStyle/>
+          <a:p>
+            <a:pPr algn="ctr"/>
+            <a:endParaRPr lang="en-GB" sz="3200" dirty="0">
+              <a:solidFill>
+                <a:schemeClr val="tx1"/>
+              </a:solidFill>
+              <a:latin typeface="Arial" panose="020B0604020202020204" pitchFamily="34" charset="0"/>
+              <a:cs typeface="Arial" panose="020B0604020202020204" pitchFamily="34" charset="0"/>
+            </a:endParaRPr>
+          </a:p>
+        </p:txBody>
+      </p:sp>
+      <p:grpSp>
+        <p:nvGrpSpPr>
+          <p:cNvPr id="34" name="Gruppo 13">
+            <a:extLst>
+              <a:ext uri="{FF2B5EF4-FFF2-40B4-BE49-F238E27FC236}">
+                <a16:creationId xmlns:a16="http://schemas.microsoft.com/office/drawing/2014/main" id="{4211E45C-1E45-422F-876C-0C7922FDC8EF}"/>
+              </a:ext>
+            </a:extLst>
+          </p:cNvPr>
+          <p:cNvGrpSpPr/>
+          <p:nvPr/>
+        </p:nvGrpSpPr>
+        <p:grpSpPr>
+          <a:xfrm>
+            <a:off x="7925643" y="3452682"/>
+            <a:ext cx="534256" cy="485091"/>
+            <a:chOff x="439547" y="2285573"/>
+            <a:chExt cx="1136114" cy="1278743"/>
+          </a:xfrm>
+        </p:grpSpPr>
+        <p:sp>
+          <p:nvSpPr>
+            <p:cNvPr id="35" name="Suono 14">
+              <a:hlinkClick r:id="" action="ppaction://noaction" highlightClick="1"/>
+              <a:extLst>
+                <a:ext uri="{FF2B5EF4-FFF2-40B4-BE49-F238E27FC236}">
+                  <a16:creationId xmlns:a16="http://schemas.microsoft.com/office/drawing/2014/main" id="{E78A4AB8-2E21-4FDF-83B2-DC365D48CE8A}"/>
+                </a:ext>
+              </a:extLst>
+            </p:cNvPr>
+            <p:cNvSpPr/>
+            <p:nvPr/>
+          </p:nvSpPr>
+          <p:spPr>
+            <a:xfrm>
+              <a:off x="439547" y="2285573"/>
+              <a:ext cx="1136114" cy="1278743"/>
+            </a:xfrm>
+            <a:prstGeom prst="actionButtonSound">
+              <a:avLst/>
+            </a:prstGeom>
+            <a:noFill/>
+            <a:ln w="38100">
+              <a:solidFill>
+                <a:schemeClr val="tx1"/>
+              </a:solidFill>
+            </a:ln>
+          </p:spPr>
+          <p:style>
+            <a:lnRef idx="2">
+              <a:schemeClr val="accent1">
+                <a:shade val="50000"/>
+              </a:schemeClr>
+            </a:lnRef>
+            <a:fillRef idx="1">
+              <a:schemeClr val="accent1"/>
+            </a:fillRef>
+            <a:effectRef idx="0">
+              <a:schemeClr val="accent1"/>
+            </a:effectRef>
+            <a:fontRef idx="minor">
+              <a:schemeClr val="lt1"/>
+            </a:fontRef>
+          </p:style>
+          <p:txBody>
+            <a:bodyPr rtlCol="0" anchor="ctr"/>
+            <a:lstStyle/>
+            <a:p>
+              <a:pPr algn="ctr"/>
+              <a:endParaRPr lang="en-GB" dirty="0"/>
+            </a:p>
+          </p:txBody>
+        </p:sp>
+        <p:sp>
+          <p:nvSpPr>
+            <p:cNvPr id="36" name="Rettangolo 15">
+              <a:extLst>
+                <a:ext uri="{FF2B5EF4-FFF2-40B4-BE49-F238E27FC236}">
+                  <a16:creationId xmlns:a16="http://schemas.microsoft.com/office/drawing/2014/main" id="{C563E4AF-0F0F-4D56-8DBF-BE7245B2D171}"/>
+                </a:ext>
+              </a:extLst>
+            </p:cNvPr>
+            <p:cNvSpPr/>
+            <p:nvPr/>
+          </p:nvSpPr>
+          <p:spPr>
+            <a:xfrm>
+              <a:off x="439547" y="2285573"/>
+              <a:ext cx="1136114" cy="1278743"/>
+            </a:xfrm>
+            <a:prstGeom prst="rect">
+              <a:avLst/>
+            </a:prstGeom>
+            <a:noFill/>
+            <a:ln w="38100">
+              <a:solidFill>
+                <a:schemeClr val="bg1"/>
+              </a:solidFill>
+            </a:ln>
+          </p:spPr>
+          <p:style>
+            <a:lnRef idx="2">
+              <a:schemeClr val="accent1">
+                <a:shade val="50000"/>
+              </a:schemeClr>
+            </a:lnRef>
+            <a:fillRef idx="1">
+              <a:schemeClr val="accent1"/>
+            </a:fillRef>
+            <a:effectRef idx="0">
+              <a:schemeClr val="accent1"/>
+            </a:effectRef>
+            <a:fontRef idx="minor">
+              <a:schemeClr val="lt1"/>
+            </a:fontRef>
+          </p:style>
+          <p:txBody>
+            <a:bodyPr rtlCol="0" anchor="ctr"/>
+            <a:lstStyle/>
+            <a:p>
+              <a:pPr algn="ctr"/>
+              <a:endParaRPr lang="en-GB"/>
+            </a:p>
+          </p:txBody>
+        </p:sp>
+      </p:grpSp>
+      <p:sp>
+        <p:nvSpPr>
+          <p:cNvPr id="37" name="TextBox 36">
+            <a:extLst>
+              <a:ext uri="{FF2B5EF4-FFF2-40B4-BE49-F238E27FC236}">
+                <a16:creationId xmlns:a16="http://schemas.microsoft.com/office/drawing/2014/main" id="{9E10EF52-1C2E-4D3F-A621-D8B5376959A3}"/>
+              </a:ext>
+            </a:extLst>
+          </p:cNvPr>
+          <p:cNvSpPr txBox="1"/>
+          <p:nvPr/>
+        </p:nvSpPr>
+        <p:spPr>
+          <a:xfrm>
+            <a:off x="7730615" y="3772750"/>
+            <a:ext cx="947859" cy="584775"/>
+          </a:xfrm>
+          <a:prstGeom prst="rect">
+            <a:avLst/>
+          </a:prstGeom>
+          <a:noFill/>
+        </p:spPr>
+        <p:txBody>
+          <a:bodyPr wrap="square" rtlCol="0">
+            <a:spAutoFit/>
+          </a:bodyPr>
+          <a:lstStyle/>
+          <a:p>
+            <a:r>
+              <a:rPr lang="it-IT" sz="3200" dirty="0" err="1">
+                <a:latin typeface="Arial" panose="020B0604020202020204" pitchFamily="34" charset="0"/>
+                <a:cs typeface="Arial" panose="020B0604020202020204" pitchFamily="34" charset="0"/>
+              </a:rPr>
+              <a:t>wug</a:t>
+            </a:r>
+            <a:endParaRPr lang="en-GB" sz="3200" dirty="0">
+              <a:latin typeface="Arial" panose="020B0604020202020204" pitchFamily="34" charset="0"/>
+              <a:cs typeface="Arial" panose="020B0604020202020204" pitchFamily="34" charset="0"/>
+            </a:endParaRPr>
+          </a:p>
+        </p:txBody>
+      </p:sp>
+      <p:sp>
+        <p:nvSpPr>
+          <p:cNvPr id="38" name="Rectangle: Rounded Corners 37">
+            <a:extLst>
+              <a:ext uri="{FF2B5EF4-FFF2-40B4-BE49-F238E27FC236}">
+                <a16:creationId xmlns:a16="http://schemas.microsoft.com/office/drawing/2014/main" id="{307DEE5D-CB6C-4A0D-9681-E41B780B36DA}"/>
+              </a:ext>
+            </a:extLst>
+          </p:cNvPr>
+          <p:cNvSpPr/>
+          <p:nvPr/>
+        </p:nvSpPr>
+        <p:spPr>
+          <a:xfrm>
+            <a:off x="9823807" y="4221564"/>
+            <a:ext cx="1964957" cy="1568747"/>
+          </a:xfrm>
+          <a:prstGeom prst="roundRect">
+            <a:avLst/>
+          </a:prstGeom>
+          <a:solidFill>
+            <a:schemeClr val="bg1"/>
+          </a:solidFill>
+          <a:ln w="28575">
+            <a:solidFill>
+              <a:schemeClr val="tx1"/>
+            </a:solidFill>
+          </a:ln>
+        </p:spPr>
+        <p:style>
+          <a:lnRef idx="2">
+            <a:schemeClr val="accent1">
+              <a:shade val="50000"/>
+            </a:schemeClr>
+          </a:lnRef>
+          <a:fillRef idx="1">
+            <a:schemeClr val="accent1"/>
+          </a:fillRef>
+          <a:effectRef idx="0">
+            <a:schemeClr val="accent1"/>
+          </a:effectRef>
+          <a:fontRef idx="minor">
+            <a:schemeClr val="lt1"/>
+          </a:fontRef>
+        </p:style>
+        <p:txBody>
+          <a:bodyPr rtlCol="0" anchor="ctr"/>
+          <a:lstStyle/>
+          <a:p>
+            <a:pPr algn="ctr"/>
+            <a:endParaRPr lang="en-GB" sz="3200" dirty="0">
+              <a:solidFill>
+                <a:schemeClr val="tx1"/>
+              </a:solidFill>
+              <a:latin typeface="Arial" panose="020B0604020202020204" pitchFamily="34" charset="0"/>
+              <a:cs typeface="Arial" panose="020B0604020202020204" pitchFamily="34" charset="0"/>
+            </a:endParaRPr>
+          </a:p>
+        </p:txBody>
+      </p:sp>
       <p:pic>
         <p:nvPicPr>
-          <p:cNvPr id="31" name="Picture 30">
-            <a:extLst>
-              <a:ext uri="{FF2B5EF4-FFF2-40B4-BE49-F238E27FC236}">
-                <a16:creationId xmlns:a16="http://schemas.microsoft.com/office/drawing/2014/main" id="{6CB96256-BB51-4DCC-9ED8-023B5D8D8802}"/>
+          <p:cNvPr id="40" name="Picture 39">
+            <a:extLst>
+              <a:ext uri="{FF2B5EF4-FFF2-40B4-BE49-F238E27FC236}">
+                <a16:creationId xmlns:a16="http://schemas.microsoft.com/office/drawing/2014/main" id="{E280C3D5-9C93-4714-8E32-446CB4BB7B02}"/>
               </a:ext>
             </a:extLst>
           </p:cNvPr>
@@ -5402,21 +5985,442 @@
           </p:cNvPicPr>
           <p:nvPr/>
         </p:nvPicPr>
-        <p:blipFill rotWithShape="1">
-          <a:blip r:embed="rId5"/>
-          <a:srcRect l="8065"/>
-          <a:stretch/>
+        <p:blipFill>
+          <a:blip r:embed="rId3"/>
+          <a:stretch>
+            <a:fillRect/>
+          </a:stretch>
         </p:blipFill>
         <p:spPr>
           <a:xfrm>
-            <a:off x="7349665" y="2597634"/>
-            <a:ext cx="969144" cy="825542"/>
+            <a:off x="8614246" y="2559078"/>
+            <a:ext cx="1164774" cy="940953"/>
           </a:xfrm>
           <a:prstGeom prst="rect">
             <a:avLst/>
           </a:prstGeom>
         </p:spPr>
       </p:pic>
+      <p:sp>
+        <p:nvSpPr>
+          <p:cNvPr id="42" name="TextBox 41">
+            <a:extLst>
+              <a:ext uri="{FF2B5EF4-FFF2-40B4-BE49-F238E27FC236}">
+                <a16:creationId xmlns:a16="http://schemas.microsoft.com/office/drawing/2014/main" id="{52BC60D0-2E2F-4733-9AE7-D4D33685F43D}"/>
+              </a:ext>
+            </a:extLst>
+          </p:cNvPr>
+          <p:cNvSpPr txBox="1"/>
+          <p:nvPr/>
+        </p:nvSpPr>
+        <p:spPr>
+          <a:xfrm>
+            <a:off x="8281327" y="1389795"/>
+            <a:ext cx="3783806" cy="830997"/>
+          </a:xfrm>
+          <a:prstGeom prst="rect">
+            <a:avLst/>
+          </a:prstGeom>
+          <a:noFill/>
+        </p:spPr>
+        <p:txBody>
+          <a:bodyPr wrap="square" rtlCol="0">
+            <a:spAutoFit/>
+          </a:bodyPr>
+          <a:lstStyle/>
+          <a:p>
+            <a:r>
+              <a:rPr lang="it-IT" sz="2400" i="1" dirty="0">
+                <a:latin typeface="Arial" panose="020B0604020202020204" pitchFamily="34" charset="0"/>
+                <a:cs typeface="Arial" panose="020B0604020202020204" pitchFamily="34" charset="0"/>
+              </a:rPr>
+              <a:t>«Select the </a:t>
+            </a:r>
+            <a:r>
+              <a:rPr lang="it-IT" sz="2400" b="1" i="1" dirty="0">
+                <a:latin typeface="Arial" panose="020B0604020202020204" pitchFamily="34" charset="0"/>
+                <a:cs typeface="Arial" panose="020B0604020202020204" pitchFamily="34" charset="0"/>
+              </a:rPr>
+              <a:t>label</a:t>
+            </a:r>
+            <a:r>
+              <a:rPr lang="it-IT" sz="2400" i="1" dirty="0">
+                <a:latin typeface="Arial" panose="020B0604020202020204" pitchFamily="34" charset="0"/>
+                <a:cs typeface="Arial" panose="020B0604020202020204" pitchFamily="34" charset="0"/>
+              </a:rPr>
+              <a:t> </a:t>
+            </a:r>
+            <a:r>
+              <a:rPr lang="it-IT" sz="2400" i="1" dirty="0" err="1">
+                <a:latin typeface="Arial" panose="020B0604020202020204" pitchFamily="34" charset="0"/>
+                <a:cs typeface="Arial" panose="020B0604020202020204" pitchFamily="34" charset="0"/>
+              </a:rPr>
+              <a:t>that</a:t>
+            </a:r>
+            <a:r>
+              <a:rPr lang="it-IT" sz="2400" i="1" dirty="0">
+                <a:latin typeface="Arial" panose="020B0604020202020204" pitchFamily="34" charset="0"/>
+                <a:cs typeface="Arial" panose="020B0604020202020204" pitchFamily="34" charset="0"/>
+              </a:rPr>
+              <a:t> best matches the </a:t>
+            </a:r>
+            <a:r>
+              <a:rPr lang="it-IT" sz="2400" b="1" i="1" dirty="0" err="1">
+                <a:latin typeface="Arial" panose="020B0604020202020204" pitchFamily="34" charset="0"/>
+                <a:cs typeface="Arial" panose="020B0604020202020204" pitchFamily="34" charset="0"/>
+              </a:rPr>
+              <a:t>fribble</a:t>
+            </a:r>
+            <a:r>
+              <a:rPr lang="it-IT" sz="2400" i="1" dirty="0">
+                <a:latin typeface="Arial" panose="020B0604020202020204" pitchFamily="34" charset="0"/>
+                <a:cs typeface="Arial" panose="020B0604020202020204" pitchFamily="34" charset="0"/>
+              </a:rPr>
+              <a:t>»</a:t>
+            </a:r>
+            <a:endParaRPr lang="en-GB" sz="2400" i="1" dirty="0">
+              <a:latin typeface="Arial" panose="020B0604020202020204" pitchFamily="34" charset="0"/>
+              <a:cs typeface="Arial" panose="020B0604020202020204" pitchFamily="34" charset="0"/>
+            </a:endParaRPr>
+          </a:p>
+        </p:txBody>
+      </p:sp>
+      <p:grpSp>
+        <p:nvGrpSpPr>
+          <p:cNvPr id="43" name="Gruppo 13">
+            <a:extLst>
+              <a:ext uri="{FF2B5EF4-FFF2-40B4-BE49-F238E27FC236}">
+                <a16:creationId xmlns:a16="http://schemas.microsoft.com/office/drawing/2014/main" id="{CF6EEA7D-331A-4331-89D3-4A0F7DA19AD4}"/>
+              </a:ext>
+            </a:extLst>
+          </p:cNvPr>
+          <p:cNvGrpSpPr/>
+          <p:nvPr/>
+        </p:nvGrpSpPr>
+        <p:grpSpPr>
+          <a:xfrm>
+            <a:off x="9012989" y="3440698"/>
+            <a:ext cx="534256" cy="485091"/>
+            <a:chOff x="439547" y="2285573"/>
+            <a:chExt cx="1136114" cy="1278743"/>
+          </a:xfrm>
+        </p:grpSpPr>
+        <p:sp>
+          <p:nvSpPr>
+            <p:cNvPr id="44" name="Suono 14">
+              <a:hlinkClick r:id="" action="ppaction://noaction" highlightClick="1"/>
+              <a:extLst>
+                <a:ext uri="{FF2B5EF4-FFF2-40B4-BE49-F238E27FC236}">
+                  <a16:creationId xmlns:a16="http://schemas.microsoft.com/office/drawing/2014/main" id="{3B4A4A29-9C70-49CF-841E-4766AA4AA24C}"/>
+                </a:ext>
+              </a:extLst>
+            </p:cNvPr>
+            <p:cNvSpPr/>
+            <p:nvPr/>
+          </p:nvSpPr>
+          <p:spPr>
+            <a:xfrm>
+              <a:off x="439547" y="2285573"/>
+              <a:ext cx="1136114" cy="1278743"/>
+            </a:xfrm>
+            <a:prstGeom prst="actionButtonSound">
+              <a:avLst/>
+            </a:prstGeom>
+            <a:noFill/>
+            <a:ln w="38100">
+              <a:solidFill>
+                <a:schemeClr val="tx1"/>
+              </a:solidFill>
+            </a:ln>
+          </p:spPr>
+          <p:style>
+            <a:lnRef idx="2">
+              <a:schemeClr val="accent1">
+                <a:shade val="50000"/>
+              </a:schemeClr>
+            </a:lnRef>
+            <a:fillRef idx="1">
+              <a:schemeClr val="accent1"/>
+            </a:fillRef>
+            <a:effectRef idx="0">
+              <a:schemeClr val="accent1"/>
+            </a:effectRef>
+            <a:fontRef idx="minor">
+              <a:schemeClr val="lt1"/>
+            </a:fontRef>
+          </p:style>
+          <p:txBody>
+            <a:bodyPr rtlCol="0" anchor="ctr"/>
+            <a:lstStyle/>
+            <a:p>
+              <a:pPr algn="ctr"/>
+              <a:endParaRPr lang="en-GB" dirty="0"/>
+            </a:p>
+          </p:txBody>
+        </p:sp>
+        <p:sp>
+          <p:nvSpPr>
+            <p:cNvPr id="45" name="Rettangolo 15">
+              <a:extLst>
+                <a:ext uri="{FF2B5EF4-FFF2-40B4-BE49-F238E27FC236}">
+                  <a16:creationId xmlns:a16="http://schemas.microsoft.com/office/drawing/2014/main" id="{AAB8BB7E-74C0-4146-B857-C48EEB12478A}"/>
+                </a:ext>
+              </a:extLst>
+            </p:cNvPr>
+            <p:cNvSpPr/>
+            <p:nvPr/>
+          </p:nvSpPr>
+          <p:spPr>
+            <a:xfrm>
+              <a:off x="439547" y="2285573"/>
+              <a:ext cx="1136114" cy="1278743"/>
+            </a:xfrm>
+            <a:prstGeom prst="rect">
+              <a:avLst/>
+            </a:prstGeom>
+            <a:noFill/>
+            <a:ln w="38100">
+              <a:solidFill>
+                <a:schemeClr val="bg1"/>
+              </a:solidFill>
+            </a:ln>
+          </p:spPr>
+          <p:style>
+            <a:lnRef idx="2">
+              <a:schemeClr val="accent1">
+                <a:shade val="50000"/>
+              </a:schemeClr>
+            </a:lnRef>
+            <a:fillRef idx="1">
+              <a:schemeClr val="accent1"/>
+            </a:fillRef>
+            <a:effectRef idx="0">
+              <a:schemeClr val="accent1"/>
+            </a:effectRef>
+            <a:fontRef idx="minor">
+              <a:schemeClr val="lt1"/>
+            </a:fontRef>
+          </p:style>
+          <p:txBody>
+            <a:bodyPr rtlCol="0" anchor="ctr"/>
+            <a:lstStyle/>
+            <a:p>
+              <a:pPr algn="ctr"/>
+              <a:endParaRPr lang="en-GB"/>
+            </a:p>
+          </p:txBody>
+        </p:sp>
+      </p:grpSp>
+      <p:grpSp>
+        <p:nvGrpSpPr>
+          <p:cNvPr id="46" name="Gruppo 13">
+            <a:extLst>
+              <a:ext uri="{FF2B5EF4-FFF2-40B4-BE49-F238E27FC236}">
+                <a16:creationId xmlns:a16="http://schemas.microsoft.com/office/drawing/2014/main" id="{C9D6BBE6-DA44-4BDD-8F23-E30416D2D011}"/>
+              </a:ext>
+            </a:extLst>
+          </p:cNvPr>
+          <p:cNvGrpSpPr/>
+          <p:nvPr/>
+        </p:nvGrpSpPr>
+        <p:grpSpPr>
+          <a:xfrm>
+            <a:off x="9925676" y="3449262"/>
+            <a:ext cx="534256" cy="485091"/>
+            <a:chOff x="439547" y="2285573"/>
+            <a:chExt cx="1136114" cy="1278743"/>
+          </a:xfrm>
+        </p:grpSpPr>
+        <p:sp>
+          <p:nvSpPr>
+            <p:cNvPr id="47" name="Suono 14">
+              <a:hlinkClick r:id="" action="ppaction://noaction" highlightClick="1"/>
+              <a:extLst>
+                <a:ext uri="{FF2B5EF4-FFF2-40B4-BE49-F238E27FC236}">
+                  <a16:creationId xmlns:a16="http://schemas.microsoft.com/office/drawing/2014/main" id="{67968ACD-261C-46A8-87ED-A13CCF88CF1E}"/>
+                </a:ext>
+              </a:extLst>
+            </p:cNvPr>
+            <p:cNvSpPr/>
+            <p:nvPr/>
+          </p:nvSpPr>
+          <p:spPr>
+            <a:xfrm>
+              <a:off x="439547" y="2285573"/>
+              <a:ext cx="1136114" cy="1278743"/>
+            </a:xfrm>
+            <a:prstGeom prst="actionButtonSound">
+              <a:avLst/>
+            </a:prstGeom>
+            <a:noFill/>
+            <a:ln w="38100">
+              <a:solidFill>
+                <a:schemeClr val="tx1"/>
+              </a:solidFill>
+            </a:ln>
+          </p:spPr>
+          <p:style>
+            <a:lnRef idx="2">
+              <a:schemeClr val="accent1">
+                <a:shade val="50000"/>
+              </a:schemeClr>
+            </a:lnRef>
+            <a:fillRef idx="1">
+              <a:schemeClr val="accent1"/>
+            </a:fillRef>
+            <a:effectRef idx="0">
+              <a:schemeClr val="accent1"/>
+            </a:effectRef>
+            <a:fontRef idx="minor">
+              <a:schemeClr val="lt1"/>
+            </a:fontRef>
+          </p:style>
+          <p:txBody>
+            <a:bodyPr rtlCol="0" anchor="ctr"/>
+            <a:lstStyle/>
+            <a:p>
+              <a:pPr algn="ctr"/>
+              <a:endParaRPr lang="en-GB" dirty="0"/>
+            </a:p>
+          </p:txBody>
+        </p:sp>
+        <p:sp>
+          <p:nvSpPr>
+            <p:cNvPr id="48" name="Rettangolo 15">
+              <a:extLst>
+                <a:ext uri="{FF2B5EF4-FFF2-40B4-BE49-F238E27FC236}">
+                  <a16:creationId xmlns:a16="http://schemas.microsoft.com/office/drawing/2014/main" id="{24D2D3D6-19DC-44A5-8F17-D2E6D9C137DA}"/>
+                </a:ext>
+              </a:extLst>
+            </p:cNvPr>
+            <p:cNvSpPr/>
+            <p:nvPr/>
+          </p:nvSpPr>
+          <p:spPr>
+            <a:xfrm>
+              <a:off x="439547" y="2285573"/>
+              <a:ext cx="1136114" cy="1278743"/>
+            </a:xfrm>
+            <a:prstGeom prst="rect">
+              <a:avLst/>
+            </a:prstGeom>
+            <a:noFill/>
+            <a:ln w="38100">
+              <a:solidFill>
+                <a:schemeClr val="bg1"/>
+              </a:solidFill>
+            </a:ln>
+          </p:spPr>
+          <p:style>
+            <a:lnRef idx="2">
+              <a:schemeClr val="accent1">
+                <a:shade val="50000"/>
+              </a:schemeClr>
+            </a:lnRef>
+            <a:fillRef idx="1">
+              <a:schemeClr val="accent1"/>
+            </a:fillRef>
+            <a:effectRef idx="0">
+              <a:schemeClr val="accent1"/>
+            </a:effectRef>
+            <a:fontRef idx="minor">
+              <a:schemeClr val="lt1"/>
+            </a:fontRef>
+          </p:style>
+          <p:txBody>
+            <a:bodyPr rtlCol="0" anchor="ctr"/>
+            <a:lstStyle/>
+            <a:p>
+              <a:pPr algn="ctr"/>
+              <a:endParaRPr lang="en-GB"/>
+            </a:p>
+          </p:txBody>
+        </p:sp>
+      </p:grpSp>
+      <p:sp>
+        <p:nvSpPr>
+          <p:cNvPr id="49" name="TextBox 48">
+            <a:extLst>
+              <a:ext uri="{FF2B5EF4-FFF2-40B4-BE49-F238E27FC236}">
+                <a16:creationId xmlns:a16="http://schemas.microsoft.com/office/drawing/2014/main" id="{BA6C35AD-BDB9-4A30-AB8F-2453109DAA82}"/>
+              </a:ext>
+            </a:extLst>
+          </p:cNvPr>
+          <p:cNvSpPr txBox="1"/>
+          <p:nvPr/>
+        </p:nvSpPr>
+        <p:spPr>
+          <a:xfrm>
+            <a:off x="8910773" y="3787242"/>
+            <a:ext cx="947859" cy="584775"/>
+          </a:xfrm>
+          <a:prstGeom prst="rect">
+            <a:avLst/>
+          </a:prstGeom>
+          <a:noFill/>
+        </p:spPr>
+        <p:txBody>
+          <a:bodyPr wrap="square" rtlCol="0">
+            <a:spAutoFit/>
+          </a:bodyPr>
+          <a:lstStyle/>
+          <a:p>
+            <a:r>
+              <a:rPr lang="it-IT" sz="3200" dirty="0" err="1">
+                <a:latin typeface="Arial" panose="020B0604020202020204" pitchFamily="34" charset="0"/>
+                <a:cs typeface="Arial" panose="020B0604020202020204" pitchFamily="34" charset="0"/>
+              </a:rPr>
+              <a:t>tob</a:t>
+            </a:r>
+            <a:endParaRPr lang="en-GB" sz="3200" dirty="0">
+              <a:latin typeface="Arial" panose="020B0604020202020204" pitchFamily="34" charset="0"/>
+              <a:cs typeface="Arial" panose="020B0604020202020204" pitchFamily="34" charset="0"/>
+            </a:endParaRPr>
+          </a:p>
+        </p:txBody>
+      </p:sp>
+      <p:sp>
+        <p:nvSpPr>
+          <p:cNvPr id="50" name="TextBox 49">
+            <a:extLst>
+              <a:ext uri="{FF2B5EF4-FFF2-40B4-BE49-F238E27FC236}">
+                <a16:creationId xmlns:a16="http://schemas.microsoft.com/office/drawing/2014/main" id="{7886B644-3652-4FCA-AA75-92C9AA4CA565}"/>
+              </a:ext>
+            </a:extLst>
+          </p:cNvPr>
+          <p:cNvSpPr txBox="1"/>
+          <p:nvPr/>
+        </p:nvSpPr>
+        <p:spPr>
+          <a:xfrm>
+            <a:off x="9854286" y="3775258"/>
+            <a:ext cx="947859" cy="584775"/>
+          </a:xfrm>
+          <a:prstGeom prst="rect">
+            <a:avLst/>
+          </a:prstGeom>
+          <a:noFill/>
+        </p:spPr>
+        <p:txBody>
+          <a:bodyPr wrap="square" rtlCol="0">
+            <a:spAutoFit/>
+          </a:bodyPr>
+          <a:lstStyle/>
+          <a:p>
+            <a:r>
+              <a:rPr lang="it-IT" sz="3200" dirty="0" err="1">
+                <a:latin typeface="Arial" panose="020B0604020202020204" pitchFamily="34" charset="0"/>
+                <a:cs typeface="Arial" panose="020B0604020202020204" pitchFamily="34" charset="0"/>
+              </a:rPr>
+              <a:t>dep</a:t>
+            </a:r>
+            <a:endParaRPr lang="en-GB" sz="3200" dirty="0">
+              <a:latin typeface="Arial" panose="020B0604020202020204" pitchFamily="34" charset="0"/>
+              <a:cs typeface="Arial" panose="020B0604020202020204" pitchFamily="34" charset="0"/>
+            </a:endParaRPr>
+          </a:p>
+        </p:txBody>
+      </p:sp>
     </p:spTree>
     <p:extLst>
       <p:ext uri="{BB962C8B-B14F-4D97-AF65-F5344CB8AC3E}">
@@ -5452,7 +6456,7 @@
           <p:cNvPr id="4" name="TextBox 3">
             <a:extLst>
               <a:ext uri="{FF2B5EF4-FFF2-40B4-BE49-F238E27FC236}">
-                <a16:creationId xmlns:a16="http://schemas.microsoft.com/office/drawing/2014/main" id="{97ADA43C-E64E-4A7A-A395-958080FF3B7C}"/>
+                <a16:creationId xmlns:a16="http://schemas.microsoft.com/office/drawing/2014/main" id="{1EE176F0-B740-4F11-9387-5B461E4192E0}"/>
               </a:ext>
             </a:extLst>
           </p:cNvPr>
@@ -5462,7 +6466,7 @@
         <p:spPr>
           <a:xfrm>
             <a:off x="2532818" y="131021"/>
-            <a:ext cx="6858000" cy="584775"/>
+            <a:ext cx="6858000" cy="954107"/>
           </a:xfrm>
           <a:prstGeom prst="rect">
             <a:avLst/>
@@ -5477,32 +6481,21 @@
           <a:p>
             <a:pPr algn="ctr"/>
             <a:r>
-              <a:rPr lang="it-IT" sz="3200" dirty="0" err="1">
-                <a:latin typeface="Arial" panose="020B0604020202020204" pitchFamily="34" charset="0"/>
-                <a:cs typeface="Arial" panose="020B0604020202020204" pitchFamily="34" charset="0"/>
-              </a:rPr>
-              <a:t>Magnitude</a:t>
-            </a:r>
-            <a:r>
-              <a:rPr lang="it-IT" sz="3200" dirty="0">
-                <a:latin typeface="Arial" panose="020B0604020202020204" pitchFamily="34" charset="0"/>
-                <a:cs typeface="Arial" panose="020B0604020202020204" pitchFamily="34" charset="0"/>
-              </a:rPr>
-              <a:t> </a:t>
-            </a:r>
-            <a:r>
-              <a:rPr lang="it-IT" sz="3200" dirty="0" err="1">
-                <a:latin typeface="Arial" panose="020B0604020202020204" pitchFamily="34" charset="0"/>
-                <a:cs typeface="Arial" panose="020B0604020202020204" pitchFamily="34" charset="0"/>
-              </a:rPr>
-              <a:t>estimation</a:t>
-            </a:r>
-            <a:r>
-              <a:rPr lang="it-IT" sz="3200" dirty="0">
-                <a:latin typeface="Arial" panose="020B0604020202020204" pitchFamily="34" charset="0"/>
-                <a:cs typeface="Arial" panose="020B0604020202020204" pitchFamily="34" charset="0"/>
-              </a:rPr>
-              <a:t> task</a:t>
+              <a:rPr lang="en-GB" sz="3200" dirty="0">
+                <a:latin typeface="Arial" panose="020B0604020202020204" pitchFamily="34" charset="0"/>
+                <a:cs typeface="Arial" panose="020B0604020202020204" pitchFamily="34" charset="0"/>
+              </a:rPr>
+              <a:t>Generalization tasks</a:t>
+            </a:r>
+          </a:p>
+          <a:p>
+            <a:pPr algn="ctr"/>
+            <a:r>
+              <a:rPr lang="en-GB" sz="2400" dirty="0">
+                <a:latin typeface="Arial" panose="020B0604020202020204" pitchFamily="34" charset="0"/>
+                <a:cs typeface="Arial" panose="020B0604020202020204" pitchFamily="34" charset="0"/>
+              </a:rPr>
+              <a:t>Low frequency exemplars</a:t>
             </a:r>
             <a:endParaRPr lang="en-GB" sz="3200" dirty="0">
               <a:latin typeface="Arial" panose="020B0604020202020204" pitchFamily="34" charset="0"/>
@@ -5513,10 +6506,80 @@
       </p:sp>
       <p:sp>
         <p:nvSpPr>
-          <p:cNvPr id="13" name="CasellaDiTesto 28">
-            <a:extLst>
-              <a:ext uri="{FF2B5EF4-FFF2-40B4-BE49-F238E27FC236}">
-                <a16:creationId xmlns:a16="http://schemas.microsoft.com/office/drawing/2014/main" id="{A07B1D01-78C2-4943-B2B5-6EAC29CBD878}"/>
+          <p:cNvPr id="5" name="Rectangle: Rounded Corners 4">
+            <a:extLst>
+              <a:ext uri="{FF2B5EF4-FFF2-40B4-BE49-F238E27FC236}">
+                <a16:creationId xmlns:a16="http://schemas.microsoft.com/office/drawing/2014/main" id="{2AAF000F-807F-4809-BBFC-7D5C3A134F50}"/>
+              </a:ext>
+            </a:extLst>
+          </p:cNvPr>
+          <p:cNvSpPr/>
+          <p:nvPr/>
+        </p:nvSpPr>
+        <p:spPr>
+          <a:xfrm>
+            <a:off x="318918" y="1367566"/>
+            <a:ext cx="1981057" cy="1500668"/>
+          </a:xfrm>
+          <a:prstGeom prst="roundRect">
+            <a:avLst/>
+          </a:prstGeom>
+          <a:solidFill>
+            <a:schemeClr val="bg1"/>
+          </a:solidFill>
+          <a:ln w="28575">
+            <a:solidFill>
+              <a:schemeClr val="tx1"/>
+            </a:solidFill>
+          </a:ln>
+        </p:spPr>
+        <p:style>
+          <a:lnRef idx="2">
+            <a:schemeClr val="accent1">
+              <a:shade val="50000"/>
+            </a:schemeClr>
+          </a:lnRef>
+          <a:fillRef idx="1">
+            <a:schemeClr val="accent1"/>
+          </a:fillRef>
+          <a:effectRef idx="0">
+            <a:schemeClr val="accent1"/>
+          </a:effectRef>
+          <a:fontRef idx="minor">
+            <a:schemeClr val="lt1"/>
+          </a:fontRef>
+        </p:style>
+        <p:txBody>
+          <a:bodyPr rtlCol="0" anchor="ctr"/>
+          <a:lstStyle/>
+          <a:p>
+            <a:pPr algn="ctr"/>
+            <a:r>
+              <a:rPr lang="it-IT" sz="3200" dirty="0">
+                <a:solidFill>
+                  <a:schemeClr val="tx1"/>
+                </a:solidFill>
+                <a:latin typeface="Arial" panose="020B0604020202020204" pitchFamily="34" charset="0"/>
+                <a:cs typeface="Arial" panose="020B0604020202020204" pitchFamily="34" charset="0"/>
+              </a:rPr>
+              <a:t>+</a:t>
+            </a:r>
+            <a:endParaRPr lang="en-GB" sz="3200" dirty="0">
+              <a:solidFill>
+                <a:schemeClr val="tx1"/>
+              </a:solidFill>
+              <a:latin typeface="Arial" panose="020B0604020202020204" pitchFamily="34" charset="0"/>
+              <a:cs typeface="Arial" panose="020B0604020202020204" pitchFamily="34" charset="0"/>
+            </a:endParaRPr>
+          </a:p>
+        </p:txBody>
+      </p:sp>
+      <p:sp>
+        <p:nvSpPr>
+          <p:cNvPr id="6" name="CasellaDiTesto 28">
+            <a:extLst>
+              <a:ext uri="{FF2B5EF4-FFF2-40B4-BE49-F238E27FC236}">
+                <a16:creationId xmlns:a16="http://schemas.microsoft.com/office/drawing/2014/main" id="{8D4DC71E-3660-428C-AA62-0AC2E424FF27}"/>
               </a:ext>
             </a:extLst>
           </p:cNvPr>
@@ -5525,7 +6588,7 @@
         </p:nvSpPr>
         <p:spPr>
           <a:xfrm>
-            <a:off x="5898483" y="4186741"/>
+            <a:off x="2939533" y="4348651"/>
             <a:ext cx="1293558" cy="400110"/>
           </a:xfrm>
           <a:prstGeom prst="rect">
@@ -5544,7 +6607,1758 @@
                 <a:latin typeface="Arial" panose="020B0604020202020204" pitchFamily="34" charset="0"/>
                 <a:cs typeface="Arial" panose="020B0604020202020204" pitchFamily="34" charset="0"/>
               </a:rPr>
+              <a:t>3500 </a:t>
+            </a:r>
+            <a:r>
+              <a:rPr lang="en-GB" sz="2000" dirty="0" err="1">
+                <a:latin typeface="Arial" panose="020B0604020202020204" pitchFamily="34" charset="0"/>
+                <a:cs typeface="Arial" panose="020B0604020202020204" pitchFamily="34" charset="0"/>
+              </a:rPr>
+              <a:t>ms</a:t>
+            </a:r>
+            <a:endParaRPr lang="en-GB" sz="2000" dirty="0">
+              <a:latin typeface="Arial" panose="020B0604020202020204" pitchFamily="34" charset="0"/>
+              <a:cs typeface="Arial" panose="020B0604020202020204" pitchFamily="34" charset="0"/>
+            </a:endParaRPr>
+          </a:p>
+        </p:txBody>
+      </p:sp>
+      <p:sp>
+        <p:nvSpPr>
+          <p:cNvPr id="8" name="CasellaDiTesto 28">
+            <a:extLst>
+              <a:ext uri="{FF2B5EF4-FFF2-40B4-BE49-F238E27FC236}">
+                <a16:creationId xmlns:a16="http://schemas.microsoft.com/office/drawing/2014/main" id="{F425339B-D093-44B9-82F1-262664BDE7B8}"/>
+              </a:ext>
+            </a:extLst>
+          </p:cNvPr>
+          <p:cNvSpPr txBox="1"/>
+          <p:nvPr/>
+        </p:nvSpPr>
+        <p:spPr>
+          <a:xfrm>
+            <a:off x="4086153" y="5594821"/>
+            <a:ext cx="3087942" cy="400110"/>
+          </a:xfrm>
+          <a:prstGeom prst="rect">
+            <a:avLst/>
+          </a:prstGeom>
+          <a:noFill/>
+        </p:spPr>
+        <p:txBody>
+          <a:bodyPr wrap="square" rtlCol="0">
+            <a:spAutoFit/>
+          </a:bodyPr>
+          <a:lstStyle/>
+          <a:p>
+            <a:r>
+              <a:rPr lang="en-GB" sz="2000" dirty="0">
+                <a:latin typeface="Arial" panose="020B0604020202020204" pitchFamily="34" charset="0"/>
+                <a:cs typeface="Arial" panose="020B0604020202020204" pitchFamily="34" charset="0"/>
+              </a:rPr>
+              <a:t>1000 </a:t>
+            </a:r>
+            <a:r>
+              <a:rPr lang="en-GB" sz="2000" dirty="0" err="1">
+                <a:latin typeface="Arial" panose="020B0604020202020204" pitchFamily="34" charset="0"/>
+                <a:cs typeface="Arial" panose="020B0604020202020204" pitchFamily="34" charset="0"/>
+              </a:rPr>
+              <a:t>ms</a:t>
+            </a:r>
+            <a:r>
+              <a:rPr lang="en-GB" sz="2000" dirty="0">
+                <a:latin typeface="Arial" panose="020B0604020202020204" pitchFamily="34" charset="0"/>
+                <a:cs typeface="Arial" panose="020B0604020202020204" pitchFamily="34" charset="0"/>
+              </a:rPr>
+              <a:t> + random ISI </a:t>
+            </a:r>
+          </a:p>
+        </p:txBody>
+      </p:sp>
+      <p:cxnSp>
+        <p:nvCxnSpPr>
+          <p:cNvPr id="9" name="Connettore 2 32">
+            <a:extLst>
+              <a:ext uri="{FF2B5EF4-FFF2-40B4-BE49-F238E27FC236}">
+                <a16:creationId xmlns:a16="http://schemas.microsoft.com/office/drawing/2014/main" id="{32F45C80-D43A-48CF-88AD-3EC057234B9D}"/>
+              </a:ext>
+            </a:extLst>
+          </p:cNvPr>
+          <p:cNvCxnSpPr>
+            <a:cxnSpLocks/>
+          </p:cNvCxnSpPr>
+          <p:nvPr/>
+        </p:nvCxnSpPr>
+        <p:spPr>
+          <a:xfrm>
+            <a:off x="318918" y="3227594"/>
+            <a:ext cx="4088692" cy="2885531"/>
+          </a:xfrm>
+          <a:prstGeom prst="straightConnector1">
+            <a:avLst/>
+          </a:prstGeom>
+          <a:ln w="38100">
+            <a:solidFill>
+              <a:srgbClr val="FF0000"/>
+            </a:solidFill>
+            <a:tailEnd type="arrow"/>
+          </a:ln>
+        </p:spPr>
+        <p:style>
+          <a:lnRef idx="2">
+            <a:schemeClr val="dk1"/>
+          </a:lnRef>
+          <a:fillRef idx="0">
+            <a:schemeClr val="dk1"/>
+          </a:fillRef>
+          <a:effectRef idx="1">
+            <a:schemeClr val="dk1"/>
+          </a:effectRef>
+          <a:fontRef idx="minor">
+            <a:schemeClr val="tx1"/>
+          </a:fontRef>
+        </p:style>
+      </p:cxnSp>
+      <p:sp>
+        <p:nvSpPr>
+          <p:cNvPr id="10" name="CasellaDiTesto 28">
+            <a:extLst>
+              <a:ext uri="{FF2B5EF4-FFF2-40B4-BE49-F238E27FC236}">
+                <a16:creationId xmlns:a16="http://schemas.microsoft.com/office/drawing/2014/main" id="{B169C700-7490-4845-99FF-7A315F831DB7}"/>
+              </a:ext>
+            </a:extLst>
+          </p:cNvPr>
+          <p:cNvSpPr txBox="1"/>
+          <p:nvPr/>
+        </p:nvSpPr>
+        <p:spPr>
+          <a:xfrm>
+            <a:off x="792612" y="2846341"/>
+            <a:ext cx="1293558" cy="400110"/>
+          </a:xfrm>
+          <a:prstGeom prst="rect">
+            <a:avLst/>
+          </a:prstGeom>
+          <a:noFill/>
+        </p:spPr>
+        <p:txBody>
+          <a:bodyPr wrap="square" rtlCol="0">
+            <a:spAutoFit/>
+          </a:bodyPr>
+          <a:lstStyle/>
+          <a:p>
+            <a:r>
+              <a:rPr lang="en-GB" sz="2000" dirty="0">
+                <a:latin typeface="Arial" panose="020B0604020202020204" pitchFamily="34" charset="0"/>
+                <a:cs typeface="Arial" panose="020B0604020202020204" pitchFamily="34" charset="0"/>
+              </a:rPr>
               <a:t>500 </a:t>
+            </a:r>
+            <a:r>
+              <a:rPr lang="en-GB" sz="2000" dirty="0" err="1">
+                <a:latin typeface="Arial" panose="020B0604020202020204" pitchFamily="34" charset="0"/>
+                <a:cs typeface="Arial" panose="020B0604020202020204" pitchFamily="34" charset="0"/>
+              </a:rPr>
+              <a:t>ms</a:t>
+            </a:r>
+            <a:endParaRPr lang="en-GB" sz="2000" dirty="0">
+              <a:latin typeface="Arial" panose="020B0604020202020204" pitchFamily="34" charset="0"/>
+              <a:cs typeface="Arial" panose="020B0604020202020204" pitchFamily="34" charset="0"/>
+            </a:endParaRPr>
+          </a:p>
+        </p:txBody>
+      </p:sp>
+      <p:sp>
+        <p:nvSpPr>
+          <p:cNvPr id="11" name="Rectangle: Rounded Corners 10">
+            <a:extLst>
+              <a:ext uri="{FF2B5EF4-FFF2-40B4-BE49-F238E27FC236}">
+                <a16:creationId xmlns:a16="http://schemas.microsoft.com/office/drawing/2014/main" id="{7DACFB8F-1786-4406-92AB-2BE0BAC5972C}"/>
+              </a:ext>
+            </a:extLst>
+          </p:cNvPr>
+          <p:cNvSpPr/>
+          <p:nvPr/>
+        </p:nvSpPr>
+        <p:spPr>
+          <a:xfrm>
+            <a:off x="1885606" y="2433576"/>
+            <a:ext cx="3135820" cy="1856067"/>
+          </a:xfrm>
+          <a:prstGeom prst="roundRect">
+            <a:avLst/>
+          </a:prstGeom>
+          <a:solidFill>
+            <a:schemeClr val="bg1"/>
+          </a:solidFill>
+          <a:ln w="28575">
+            <a:solidFill>
+              <a:schemeClr val="tx1"/>
+            </a:solidFill>
+          </a:ln>
+        </p:spPr>
+        <p:style>
+          <a:lnRef idx="2">
+            <a:schemeClr val="accent1">
+              <a:shade val="50000"/>
+            </a:schemeClr>
+          </a:lnRef>
+          <a:fillRef idx="1">
+            <a:schemeClr val="accent1"/>
+          </a:fillRef>
+          <a:effectRef idx="0">
+            <a:schemeClr val="accent1"/>
+          </a:effectRef>
+          <a:fontRef idx="minor">
+            <a:schemeClr val="lt1"/>
+          </a:fontRef>
+        </p:style>
+        <p:txBody>
+          <a:bodyPr rtlCol="0" anchor="ctr"/>
+          <a:lstStyle/>
+          <a:p>
+            <a:pPr algn="ctr"/>
+            <a:endParaRPr lang="en-GB" sz="3200" dirty="0">
+              <a:solidFill>
+                <a:schemeClr val="tx1"/>
+              </a:solidFill>
+              <a:latin typeface="Arial" panose="020B0604020202020204" pitchFamily="34" charset="0"/>
+              <a:cs typeface="Arial" panose="020B0604020202020204" pitchFamily="34" charset="0"/>
+            </a:endParaRPr>
+          </a:p>
+        </p:txBody>
+      </p:sp>
+      <p:grpSp>
+        <p:nvGrpSpPr>
+          <p:cNvPr id="13" name="Gruppo 13">
+            <a:extLst>
+              <a:ext uri="{FF2B5EF4-FFF2-40B4-BE49-F238E27FC236}">
+                <a16:creationId xmlns:a16="http://schemas.microsoft.com/office/drawing/2014/main" id="{3C203CD1-7BC2-4035-B67B-3E694E7E2548}"/>
+              </a:ext>
+            </a:extLst>
+          </p:cNvPr>
+          <p:cNvGrpSpPr/>
+          <p:nvPr/>
+        </p:nvGrpSpPr>
+        <p:grpSpPr>
+          <a:xfrm>
+            <a:off x="2086170" y="2561305"/>
+            <a:ext cx="534256" cy="485091"/>
+            <a:chOff x="439547" y="2285573"/>
+            <a:chExt cx="1136114" cy="1278743"/>
+          </a:xfrm>
+        </p:grpSpPr>
+        <p:sp>
+          <p:nvSpPr>
+            <p:cNvPr id="14" name="Suono 14">
+              <a:hlinkClick r:id="" action="ppaction://noaction" highlightClick="1"/>
+              <a:extLst>
+                <a:ext uri="{FF2B5EF4-FFF2-40B4-BE49-F238E27FC236}">
+                  <a16:creationId xmlns:a16="http://schemas.microsoft.com/office/drawing/2014/main" id="{5F720A5D-CFEC-4CF2-A452-94BF1BBA0008}"/>
+                </a:ext>
+              </a:extLst>
+            </p:cNvPr>
+            <p:cNvSpPr/>
+            <p:nvPr/>
+          </p:nvSpPr>
+          <p:spPr>
+            <a:xfrm>
+              <a:off x="439547" y="2285573"/>
+              <a:ext cx="1136114" cy="1278743"/>
+            </a:xfrm>
+            <a:prstGeom prst="actionButtonSound">
+              <a:avLst/>
+            </a:prstGeom>
+            <a:noFill/>
+            <a:ln w="38100">
+              <a:solidFill>
+                <a:schemeClr val="tx1"/>
+              </a:solidFill>
+            </a:ln>
+          </p:spPr>
+          <p:style>
+            <a:lnRef idx="2">
+              <a:schemeClr val="accent1">
+                <a:shade val="50000"/>
+              </a:schemeClr>
+            </a:lnRef>
+            <a:fillRef idx="1">
+              <a:schemeClr val="accent1"/>
+            </a:fillRef>
+            <a:effectRef idx="0">
+              <a:schemeClr val="accent1"/>
+            </a:effectRef>
+            <a:fontRef idx="minor">
+              <a:schemeClr val="lt1"/>
+            </a:fontRef>
+          </p:style>
+          <p:txBody>
+            <a:bodyPr rtlCol="0" anchor="ctr"/>
+            <a:lstStyle/>
+            <a:p>
+              <a:pPr algn="ctr"/>
+              <a:endParaRPr lang="en-GB" dirty="0"/>
+            </a:p>
+          </p:txBody>
+        </p:sp>
+        <p:sp>
+          <p:nvSpPr>
+            <p:cNvPr id="15" name="Rettangolo 15">
+              <a:extLst>
+                <a:ext uri="{FF2B5EF4-FFF2-40B4-BE49-F238E27FC236}">
+                  <a16:creationId xmlns:a16="http://schemas.microsoft.com/office/drawing/2014/main" id="{79CD7CCB-136C-46F2-A6A9-C8676C4B7F4B}"/>
+                </a:ext>
+              </a:extLst>
+            </p:cNvPr>
+            <p:cNvSpPr/>
+            <p:nvPr/>
+          </p:nvSpPr>
+          <p:spPr>
+            <a:xfrm>
+              <a:off x="439547" y="2285573"/>
+              <a:ext cx="1136114" cy="1278743"/>
+            </a:xfrm>
+            <a:prstGeom prst="rect">
+              <a:avLst/>
+            </a:prstGeom>
+            <a:noFill/>
+            <a:ln w="38100">
+              <a:solidFill>
+                <a:schemeClr val="bg1"/>
+              </a:solidFill>
+            </a:ln>
+          </p:spPr>
+          <p:style>
+            <a:lnRef idx="2">
+              <a:schemeClr val="accent1">
+                <a:shade val="50000"/>
+              </a:schemeClr>
+            </a:lnRef>
+            <a:fillRef idx="1">
+              <a:schemeClr val="accent1"/>
+            </a:fillRef>
+            <a:effectRef idx="0">
+              <a:schemeClr val="accent1"/>
+            </a:effectRef>
+            <a:fontRef idx="minor">
+              <a:schemeClr val="lt1"/>
+            </a:fontRef>
+          </p:style>
+          <p:txBody>
+            <a:bodyPr rtlCol="0" anchor="ctr"/>
+            <a:lstStyle/>
+            <a:p>
+              <a:pPr algn="ctr"/>
+              <a:endParaRPr lang="en-GB"/>
+            </a:p>
+          </p:txBody>
+        </p:sp>
+      </p:grpSp>
+      <p:sp>
+        <p:nvSpPr>
+          <p:cNvPr id="16" name="TextBox 15">
+            <a:extLst>
+              <a:ext uri="{FF2B5EF4-FFF2-40B4-BE49-F238E27FC236}">
+                <a16:creationId xmlns:a16="http://schemas.microsoft.com/office/drawing/2014/main" id="{EA6AF12B-83A8-48D0-BAEB-2D4FD43D5DDF}"/>
+              </a:ext>
+            </a:extLst>
+          </p:cNvPr>
+          <p:cNvSpPr txBox="1"/>
+          <p:nvPr/>
+        </p:nvSpPr>
+        <p:spPr>
+          <a:xfrm>
+            <a:off x="2610711" y="2425809"/>
+            <a:ext cx="1267973" cy="584775"/>
+          </a:xfrm>
+          <a:prstGeom prst="rect">
+            <a:avLst/>
+          </a:prstGeom>
+          <a:noFill/>
+        </p:spPr>
+        <p:txBody>
+          <a:bodyPr wrap="square" rtlCol="0">
+            <a:spAutoFit/>
+          </a:bodyPr>
+          <a:lstStyle/>
+          <a:p>
+            <a:r>
+              <a:rPr lang="it-IT" sz="3200" dirty="0" err="1">
+                <a:latin typeface="Arial" panose="020B0604020202020204" pitchFamily="34" charset="0"/>
+                <a:cs typeface="Arial" panose="020B0604020202020204" pitchFamily="34" charset="0"/>
+              </a:rPr>
+              <a:t>wug</a:t>
+            </a:r>
+            <a:endParaRPr lang="en-GB" sz="3200" dirty="0">
+              <a:latin typeface="Arial" panose="020B0604020202020204" pitchFamily="34" charset="0"/>
+              <a:cs typeface="Arial" panose="020B0604020202020204" pitchFamily="34" charset="0"/>
+            </a:endParaRPr>
+          </a:p>
+        </p:txBody>
+      </p:sp>
+      <p:sp>
+        <p:nvSpPr>
+          <p:cNvPr id="18" name="Rectangle: Rounded Corners 17">
+            <a:extLst>
+              <a:ext uri="{FF2B5EF4-FFF2-40B4-BE49-F238E27FC236}">
+                <a16:creationId xmlns:a16="http://schemas.microsoft.com/office/drawing/2014/main" id="{0B86A26D-B563-4C06-A0F4-AD1CA36CB0B9}"/>
+              </a:ext>
+            </a:extLst>
+          </p:cNvPr>
+          <p:cNvSpPr/>
+          <p:nvPr/>
+        </p:nvSpPr>
+        <p:spPr>
+          <a:xfrm>
+            <a:off x="4322191" y="4019695"/>
+            <a:ext cx="1981057" cy="1500668"/>
+          </a:xfrm>
+          <a:prstGeom prst="roundRect">
+            <a:avLst/>
+          </a:prstGeom>
+          <a:solidFill>
+            <a:schemeClr val="bg1"/>
+          </a:solidFill>
+          <a:ln w="28575">
+            <a:solidFill>
+              <a:schemeClr val="tx1"/>
+            </a:solidFill>
+          </a:ln>
+        </p:spPr>
+        <p:style>
+          <a:lnRef idx="2">
+            <a:schemeClr val="accent1">
+              <a:shade val="50000"/>
+            </a:schemeClr>
+          </a:lnRef>
+          <a:fillRef idx="1">
+            <a:schemeClr val="accent1"/>
+          </a:fillRef>
+          <a:effectRef idx="0">
+            <a:schemeClr val="accent1"/>
+          </a:effectRef>
+          <a:fontRef idx="minor">
+            <a:schemeClr val="lt1"/>
+          </a:fontRef>
+        </p:style>
+        <p:txBody>
+          <a:bodyPr rtlCol="0" anchor="ctr"/>
+          <a:lstStyle/>
+          <a:p>
+            <a:pPr algn="ctr"/>
+            <a:endParaRPr lang="en-GB" sz="3200" dirty="0">
+              <a:solidFill>
+                <a:schemeClr val="tx1"/>
+              </a:solidFill>
+              <a:latin typeface="Arial" panose="020B0604020202020204" pitchFamily="34" charset="0"/>
+              <a:cs typeface="Arial" panose="020B0604020202020204" pitchFamily="34" charset="0"/>
+            </a:endParaRPr>
+          </a:p>
+        </p:txBody>
+      </p:sp>
+      <p:sp>
+        <p:nvSpPr>
+          <p:cNvPr id="28" name="TextBox 27">
+            <a:extLst>
+              <a:ext uri="{FF2B5EF4-FFF2-40B4-BE49-F238E27FC236}">
+                <a16:creationId xmlns:a16="http://schemas.microsoft.com/office/drawing/2014/main" id="{5F435B34-0E34-4EE1-A85F-CC969E5B95CC}"/>
+              </a:ext>
+            </a:extLst>
+          </p:cNvPr>
+          <p:cNvSpPr txBox="1"/>
+          <p:nvPr/>
+        </p:nvSpPr>
+        <p:spPr>
+          <a:xfrm>
+            <a:off x="2454146" y="1452337"/>
+            <a:ext cx="3783806" cy="830997"/>
+          </a:xfrm>
+          <a:prstGeom prst="rect">
+            <a:avLst/>
+          </a:prstGeom>
+          <a:noFill/>
+        </p:spPr>
+        <p:txBody>
+          <a:bodyPr wrap="square" rtlCol="0">
+            <a:spAutoFit/>
+          </a:bodyPr>
+          <a:lstStyle/>
+          <a:p>
+            <a:r>
+              <a:rPr lang="it-IT" sz="2400" i="1" dirty="0">
+                <a:latin typeface="Arial" panose="020B0604020202020204" pitchFamily="34" charset="0"/>
+                <a:cs typeface="Arial" panose="020B0604020202020204" pitchFamily="34" charset="0"/>
+              </a:rPr>
+              <a:t>«Select the </a:t>
+            </a:r>
+            <a:r>
+              <a:rPr lang="it-IT" sz="2400" b="1" i="1" dirty="0" err="1">
+                <a:latin typeface="Arial" panose="020B0604020202020204" pitchFamily="34" charset="0"/>
+                <a:cs typeface="Arial" panose="020B0604020202020204" pitchFamily="34" charset="0"/>
+              </a:rPr>
+              <a:t>fribble</a:t>
+            </a:r>
+            <a:r>
+              <a:rPr lang="it-IT" sz="2400" i="1" dirty="0">
+                <a:latin typeface="Arial" panose="020B0604020202020204" pitchFamily="34" charset="0"/>
+                <a:cs typeface="Arial" panose="020B0604020202020204" pitchFamily="34" charset="0"/>
+              </a:rPr>
+              <a:t> </a:t>
+            </a:r>
+            <a:r>
+              <a:rPr lang="it-IT" sz="2400" i="1" dirty="0" err="1">
+                <a:latin typeface="Arial" panose="020B0604020202020204" pitchFamily="34" charset="0"/>
+                <a:cs typeface="Arial" panose="020B0604020202020204" pitchFamily="34" charset="0"/>
+              </a:rPr>
+              <a:t>that</a:t>
+            </a:r>
+            <a:r>
+              <a:rPr lang="it-IT" sz="2400" i="1" dirty="0">
+                <a:latin typeface="Arial" panose="020B0604020202020204" pitchFamily="34" charset="0"/>
+                <a:cs typeface="Arial" panose="020B0604020202020204" pitchFamily="34" charset="0"/>
+              </a:rPr>
+              <a:t> best matches the </a:t>
+            </a:r>
+            <a:r>
+              <a:rPr lang="it-IT" sz="2400" b="1" i="1" dirty="0">
+                <a:latin typeface="Arial" panose="020B0604020202020204" pitchFamily="34" charset="0"/>
+                <a:cs typeface="Arial" panose="020B0604020202020204" pitchFamily="34" charset="0"/>
+              </a:rPr>
+              <a:t>label</a:t>
+            </a:r>
+            <a:r>
+              <a:rPr lang="it-IT" sz="2400" i="1" dirty="0">
+                <a:latin typeface="Arial" panose="020B0604020202020204" pitchFamily="34" charset="0"/>
+                <a:cs typeface="Arial" panose="020B0604020202020204" pitchFamily="34" charset="0"/>
+              </a:rPr>
+              <a:t>»</a:t>
+            </a:r>
+            <a:endParaRPr lang="en-GB" sz="2400" i="1" dirty="0">
+              <a:latin typeface="Arial" panose="020B0604020202020204" pitchFamily="34" charset="0"/>
+              <a:cs typeface="Arial" panose="020B0604020202020204" pitchFamily="34" charset="0"/>
+            </a:endParaRPr>
+          </a:p>
+        </p:txBody>
+      </p:sp>
+      <p:sp>
+        <p:nvSpPr>
+          <p:cNvPr id="23" name="Rectangle: Rounded Corners 22">
+            <a:extLst>
+              <a:ext uri="{FF2B5EF4-FFF2-40B4-BE49-F238E27FC236}">
+                <a16:creationId xmlns:a16="http://schemas.microsoft.com/office/drawing/2014/main" id="{58183BED-25DD-49D6-A5C1-14B6ED554954}"/>
+              </a:ext>
+            </a:extLst>
+          </p:cNvPr>
+          <p:cNvSpPr/>
+          <p:nvPr/>
+        </p:nvSpPr>
+        <p:spPr>
+          <a:xfrm>
+            <a:off x="6019373" y="1427501"/>
+            <a:ext cx="1981057" cy="1500668"/>
+          </a:xfrm>
+          <a:prstGeom prst="roundRect">
+            <a:avLst/>
+          </a:prstGeom>
+          <a:solidFill>
+            <a:schemeClr val="bg1"/>
+          </a:solidFill>
+          <a:ln w="28575">
+            <a:solidFill>
+              <a:schemeClr val="tx1"/>
+            </a:solidFill>
+          </a:ln>
+        </p:spPr>
+        <p:style>
+          <a:lnRef idx="2">
+            <a:schemeClr val="accent1">
+              <a:shade val="50000"/>
+            </a:schemeClr>
+          </a:lnRef>
+          <a:fillRef idx="1">
+            <a:schemeClr val="accent1"/>
+          </a:fillRef>
+          <a:effectRef idx="0">
+            <a:schemeClr val="accent1"/>
+          </a:effectRef>
+          <a:fontRef idx="minor">
+            <a:schemeClr val="lt1"/>
+          </a:fontRef>
+        </p:style>
+        <p:txBody>
+          <a:bodyPr rtlCol="0" anchor="ctr"/>
+          <a:lstStyle/>
+          <a:p>
+            <a:pPr algn="ctr"/>
+            <a:r>
+              <a:rPr lang="it-IT" sz="3200" dirty="0">
+                <a:solidFill>
+                  <a:schemeClr val="tx1"/>
+                </a:solidFill>
+                <a:latin typeface="Arial" panose="020B0604020202020204" pitchFamily="34" charset="0"/>
+                <a:cs typeface="Arial" panose="020B0604020202020204" pitchFamily="34" charset="0"/>
+              </a:rPr>
+              <a:t>+</a:t>
+            </a:r>
+            <a:endParaRPr lang="en-GB" sz="3200" dirty="0">
+              <a:solidFill>
+                <a:schemeClr val="tx1"/>
+              </a:solidFill>
+              <a:latin typeface="Arial" panose="020B0604020202020204" pitchFamily="34" charset="0"/>
+              <a:cs typeface="Arial" panose="020B0604020202020204" pitchFamily="34" charset="0"/>
+            </a:endParaRPr>
+          </a:p>
+        </p:txBody>
+      </p:sp>
+      <p:sp>
+        <p:nvSpPr>
+          <p:cNvPr id="24" name="CasellaDiTesto 28">
+            <a:extLst>
+              <a:ext uri="{FF2B5EF4-FFF2-40B4-BE49-F238E27FC236}">
+                <a16:creationId xmlns:a16="http://schemas.microsoft.com/office/drawing/2014/main" id="{52252317-111E-4956-B35A-F2889EFD5A16}"/>
+              </a:ext>
+            </a:extLst>
+          </p:cNvPr>
+          <p:cNvSpPr txBox="1"/>
+          <p:nvPr/>
+        </p:nvSpPr>
+        <p:spPr>
+          <a:xfrm>
+            <a:off x="8639988" y="4408586"/>
+            <a:ext cx="1293558" cy="400110"/>
+          </a:xfrm>
+          <a:prstGeom prst="rect">
+            <a:avLst/>
+          </a:prstGeom>
+          <a:noFill/>
+        </p:spPr>
+        <p:txBody>
+          <a:bodyPr wrap="square" rtlCol="0">
+            <a:spAutoFit/>
+          </a:bodyPr>
+          <a:lstStyle/>
+          <a:p>
+            <a:r>
+              <a:rPr lang="en-GB" sz="2000" dirty="0">
+                <a:latin typeface="Arial" panose="020B0604020202020204" pitchFamily="34" charset="0"/>
+                <a:cs typeface="Arial" panose="020B0604020202020204" pitchFamily="34" charset="0"/>
+              </a:rPr>
+              <a:t>3500 </a:t>
+            </a:r>
+            <a:r>
+              <a:rPr lang="en-GB" sz="2000" dirty="0" err="1">
+                <a:latin typeface="Arial" panose="020B0604020202020204" pitchFamily="34" charset="0"/>
+                <a:cs typeface="Arial" panose="020B0604020202020204" pitchFamily="34" charset="0"/>
+              </a:rPr>
+              <a:t>ms</a:t>
+            </a:r>
+            <a:endParaRPr lang="en-GB" sz="2000" dirty="0">
+              <a:latin typeface="Arial" panose="020B0604020202020204" pitchFamily="34" charset="0"/>
+              <a:cs typeface="Arial" panose="020B0604020202020204" pitchFamily="34" charset="0"/>
+            </a:endParaRPr>
+          </a:p>
+        </p:txBody>
+      </p:sp>
+      <p:sp>
+        <p:nvSpPr>
+          <p:cNvPr id="25" name="CasellaDiTesto 28">
+            <a:extLst>
+              <a:ext uri="{FF2B5EF4-FFF2-40B4-BE49-F238E27FC236}">
+                <a16:creationId xmlns:a16="http://schemas.microsoft.com/office/drawing/2014/main" id="{BD90D6BB-9F92-4F98-B0C0-7816BBCABD90}"/>
+              </a:ext>
+            </a:extLst>
+          </p:cNvPr>
+          <p:cNvSpPr txBox="1"/>
+          <p:nvPr/>
+        </p:nvSpPr>
+        <p:spPr>
+          <a:xfrm>
+            <a:off x="9506149" y="5735070"/>
+            <a:ext cx="2996629" cy="400110"/>
+          </a:xfrm>
+          <a:prstGeom prst="rect">
+            <a:avLst/>
+          </a:prstGeom>
+          <a:noFill/>
+        </p:spPr>
+        <p:txBody>
+          <a:bodyPr wrap="square" rtlCol="0">
+            <a:spAutoFit/>
+          </a:bodyPr>
+          <a:lstStyle/>
+          <a:p>
+            <a:r>
+              <a:rPr lang="en-GB" sz="2000" dirty="0">
+                <a:latin typeface="Arial" panose="020B0604020202020204" pitchFamily="34" charset="0"/>
+                <a:cs typeface="Arial" panose="020B0604020202020204" pitchFamily="34" charset="0"/>
+              </a:rPr>
+              <a:t>1000 </a:t>
+            </a:r>
+            <a:r>
+              <a:rPr lang="en-GB" sz="2000" dirty="0" err="1">
+                <a:latin typeface="Arial" panose="020B0604020202020204" pitchFamily="34" charset="0"/>
+                <a:cs typeface="Arial" panose="020B0604020202020204" pitchFamily="34" charset="0"/>
+              </a:rPr>
+              <a:t>ms</a:t>
+            </a:r>
+            <a:r>
+              <a:rPr lang="en-GB" sz="2000" dirty="0">
+                <a:latin typeface="Arial" panose="020B0604020202020204" pitchFamily="34" charset="0"/>
+                <a:cs typeface="Arial" panose="020B0604020202020204" pitchFamily="34" charset="0"/>
+              </a:rPr>
+              <a:t> + random ISI </a:t>
+            </a:r>
+          </a:p>
+        </p:txBody>
+      </p:sp>
+      <p:cxnSp>
+        <p:nvCxnSpPr>
+          <p:cNvPr id="26" name="Connettore 2 32">
+            <a:extLst>
+              <a:ext uri="{FF2B5EF4-FFF2-40B4-BE49-F238E27FC236}">
+                <a16:creationId xmlns:a16="http://schemas.microsoft.com/office/drawing/2014/main" id="{A8CB6DDE-95DD-4863-9875-8D8294B910FC}"/>
+              </a:ext>
+            </a:extLst>
+          </p:cNvPr>
+          <p:cNvCxnSpPr>
+            <a:cxnSpLocks/>
+          </p:cNvCxnSpPr>
+          <p:nvPr/>
+        </p:nvCxnSpPr>
+        <p:spPr>
+          <a:xfrm>
+            <a:off x="5888006" y="3463537"/>
+            <a:ext cx="4088692" cy="2885531"/>
+          </a:xfrm>
+          <a:prstGeom prst="straightConnector1">
+            <a:avLst/>
+          </a:prstGeom>
+          <a:ln w="38100">
+            <a:solidFill>
+              <a:srgbClr val="FF0000"/>
+            </a:solidFill>
+            <a:tailEnd type="arrow"/>
+          </a:ln>
+        </p:spPr>
+        <p:style>
+          <a:lnRef idx="2">
+            <a:schemeClr val="dk1"/>
+          </a:lnRef>
+          <a:fillRef idx="0">
+            <a:schemeClr val="dk1"/>
+          </a:fillRef>
+          <a:effectRef idx="1">
+            <a:schemeClr val="dk1"/>
+          </a:effectRef>
+          <a:fontRef idx="minor">
+            <a:schemeClr val="tx1"/>
+          </a:fontRef>
+        </p:style>
+      </p:cxnSp>
+      <p:sp>
+        <p:nvSpPr>
+          <p:cNvPr id="27" name="CasellaDiTesto 28">
+            <a:extLst>
+              <a:ext uri="{FF2B5EF4-FFF2-40B4-BE49-F238E27FC236}">
+                <a16:creationId xmlns:a16="http://schemas.microsoft.com/office/drawing/2014/main" id="{D6E73E61-8D94-450A-8CB0-91FA6B312F75}"/>
+              </a:ext>
+            </a:extLst>
+          </p:cNvPr>
+          <p:cNvSpPr txBox="1"/>
+          <p:nvPr/>
+        </p:nvSpPr>
+        <p:spPr>
+          <a:xfrm>
+            <a:off x="6493067" y="2906276"/>
+            <a:ext cx="1293558" cy="400110"/>
+          </a:xfrm>
+          <a:prstGeom prst="rect">
+            <a:avLst/>
+          </a:prstGeom>
+          <a:noFill/>
+        </p:spPr>
+        <p:txBody>
+          <a:bodyPr wrap="square" rtlCol="0">
+            <a:spAutoFit/>
+          </a:bodyPr>
+          <a:lstStyle/>
+          <a:p>
+            <a:r>
+              <a:rPr lang="en-GB" sz="2000" dirty="0">
+                <a:latin typeface="Arial" panose="020B0604020202020204" pitchFamily="34" charset="0"/>
+                <a:cs typeface="Arial" panose="020B0604020202020204" pitchFamily="34" charset="0"/>
+              </a:rPr>
+              <a:t>500 </a:t>
+            </a:r>
+            <a:r>
+              <a:rPr lang="en-GB" sz="2000" dirty="0" err="1">
+                <a:latin typeface="Arial" panose="020B0604020202020204" pitchFamily="34" charset="0"/>
+                <a:cs typeface="Arial" panose="020B0604020202020204" pitchFamily="34" charset="0"/>
+              </a:rPr>
+              <a:t>ms</a:t>
+            </a:r>
+            <a:endParaRPr lang="en-GB" sz="2000" dirty="0">
+              <a:latin typeface="Arial" panose="020B0604020202020204" pitchFamily="34" charset="0"/>
+              <a:cs typeface="Arial" panose="020B0604020202020204" pitchFamily="34" charset="0"/>
+            </a:endParaRPr>
+          </a:p>
+        </p:txBody>
+      </p:sp>
+      <p:sp>
+        <p:nvSpPr>
+          <p:cNvPr id="32" name="Rectangle: Rounded Corners 31">
+            <a:extLst>
+              <a:ext uri="{FF2B5EF4-FFF2-40B4-BE49-F238E27FC236}">
+                <a16:creationId xmlns:a16="http://schemas.microsoft.com/office/drawing/2014/main" id="{652A054E-77B7-4305-BFA5-2D5076BB06BE}"/>
+              </a:ext>
+            </a:extLst>
+          </p:cNvPr>
+          <p:cNvSpPr/>
+          <p:nvPr/>
+        </p:nvSpPr>
+        <p:spPr>
+          <a:xfrm>
+            <a:off x="7586061" y="2493511"/>
+            <a:ext cx="3109709" cy="1856067"/>
+          </a:xfrm>
+          <a:prstGeom prst="roundRect">
+            <a:avLst/>
+          </a:prstGeom>
+          <a:solidFill>
+            <a:schemeClr val="bg1"/>
+          </a:solidFill>
+          <a:ln w="28575">
+            <a:solidFill>
+              <a:schemeClr val="tx1"/>
+            </a:solidFill>
+          </a:ln>
+        </p:spPr>
+        <p:style>
+          <a:lnRef idx="2">
+            <a:schemeClr val="accent1">
+              <a:shade val="50000"/>
+            </a:schemeClr>
+          </a:lnRef>
+          <a:fillRef idx="1">
+            <a:schemeClr val="accent1"/>
+          </a:fillRef>
+          <a:effectRef idx="0">
+            <a:schemeClr val="accent1"/>
+          </a:effectRef>
+          <a:fontRef idx="minor">
+            <a:schemeClr val="lt1"/>
+          </a:fontRef>
+        </p:style>
+        <p:txBody>
+          <a:bodyPr rtlCol="0" anchor="ctr"/>
+          <a:lstStyle/>
+          <a:p>
+            <a:pPr algn="ctr"/>
+            <a:endParaRPr lang="en-GB" sz="3200" dirty="0">
+              <a:solidFill>
+                <a:schemeClr val="tx1"/>
+              </a:solidFill>
+              <a:latin typeface="Arial" panose="020B0604020202020204" pitchFamily="34" charset="0"/>
+              <a:cs typeface="Arial" panose="020B0604020202020204" pitchFamily="34" charset="0"/>
+            </a:endParaRPr>
+          </a:p>
+        </p:txBody>
+      </p:sp>
+      <p:grpSp>
+        <p:nvGrpSpPr>
+          <p:cNvPr id="34" name="Gruppo 13">
+            <a:extLst>
+              <a:ext uri="{FF2B5EF4-FFF2-40B4-BE49-F238E27FC236}">
+                <a16:creationId xmlns:a16="http://schemas.microsoft.com/office/drawing/2014/main" id="{4211E45C-1E45-422F-876C-0C7922FDC8EF}"/>
+              </a:ext>
+            </a:extLst>
+          </p:cNvPr>
+          <p:cNvGrpSpPr/>
+          <p:nvPr/>
+        </p:nvGrpSpPr>
+        <p:grpSpPr>
+          <a:xfrm>
+            <a:off x="7925643" y="3452682"/>
+            <a:ext cx="534256" cy="485091"/>
+            <a:chOff x="439547" y="2285573"/>
+            <a:chExt cx="1136114" cy="1278743"/>
+          </a:xfrm>
+        </p:grpSpPr>
+        <p:sp>
+          <p:nvSpPr>
+            <p:cNvPr id="35" name="Suono 14">
+              <a:hlinkClick r:id="" action="ppaction://noaction" highlightClick="1"/>
+              <a:extLst>
+                <a:ext uri="{FF2B5EF4-FFF2-40B4-BE49-F238E27FC236}">
+                  <a16:creationId xmlns:a16="http://schemas.microsoft.com/office/drawing/2014/main" id="{E78A4AB8-2E21-4FDF-83B2-DC365D48CE8A}"/>
+                </a:ext>
+              </a:extLst>
+            </p:cNvPr>
+            <p:cNvSpPr/>
+            <p:nvPr/>
+          </p:nvSpPr>
+          <p:spPr>
+            <a:xfrm>
+              <a:off x="439547" y="2285573"/>
+              <a:ext cx="1136114" cy="1278743"/>
+            </a:xfrm>
+            <a:prstGeom prst="actionButtonSound">
+              <a:avLst/>
+            </a:prstGeom>
+            <a:noFill/>
+            <a:ln w="38100">
+              <a:solidFill>
+                <a:schemeClr val="tx1"/>
+              </a:solidFill>
+            </a:ln>
+          </p:spPr>
+          <p:style>
+            <a:lnRef idx="2">
+              <a:schemeClr val="accent1">
+                <a:shade val="50000"/>
+              </a:schemeClr>
+            </a:lnRef>
+            <a:fillRef idx="1">
+              <a:schemeClr val="accent1"/>
+            </a:fillRef>
+            <a:effectRef idx="0">
+              <a:schemeClr val="accent1"/>
+            </a:effectRef>
+            <a:fontRef idx="minor">
+              <a:schemeClr val="lt1"/>
+            </a:fontRef>
+          </p:style>
+          <p:txBody>
+            <a:bodyPr rtlCol="0" anchor="ctr"/>
+            <a:lstStyle/>
+            <a:p>
+              <a:pPr algn="ctr"/>
+              <a:endParaRPr lang="en-GB" dirty="0"/>
+            </a:p>
+          </p:txBody>
+        </p:sp>
+        <p:sp>
+          <p:nvSpPr>
+            <p:cNvPr id="36" name="Rettangolo 15">
+              <a:extLst>
+                <a:ext uri="{FF2B5EF4-FFF2-40B4-BE49-F238E27FC236}">
+                  <a16:creationId xmlns:a16="http://schemas.microsoft.com/office/drawing/2014/main" id="{C563E4AF-0F0F-4D56-8DBF-BE7245B2D171}"/>
+                </a:ext>
+              </a:extLst>
+            </p:cNvPr>
+            <p:cNvSpPr/>
+            <p:nvPr/>
+          </p:nvSpPr>
+          <p:spPr>
+            <a:xfrm>
+              <a:off x="439547" y="2285573"/>
+              <a:ext cx="1136114" cy="1278743"/>
+            </a:xfrm>
+            <a:prstGeom prst="rect">
+              <a:avLst/>
+            </a:prstGeom>
+            <a:noFill/>
+            <a:ln w="38100">
+              <a:solidFill>
+                <a:schemeClr val="bg1"/>
+              </a:solidFill>
+            </a:ln>
+          </p:spPr>
+          <p:style>
+            <a:lnRef idx="2">
+              <a:schemeClr val="accent1">
+                <a:shade val="50000"/>
+              </a:schemeClr>
+            </a:lnRef>
+            <a:fillRef idx="1">
+              <a:schemeClr val="accent1"/>
+            </a:fillRef>
+            <a:effectRef idx="0">
+              <a:schemeClr val="accent1"/>
+            </a:effectRef>
+            <a:fontRef idx="minor">
+              <a:schemeClr val="lt1"/>
+            </a:fontRef>
+          </p:style>
+          <p:txBody>
+            <a:bodyPr rtlCol="0" anchor="ctr"/>
+            <a:lstStyle/>
+            <a:p>
+              <a:pPr algn="ctr"/>
+              <a:endParaRPr lang="en-GB"/>
+            </a:p>
+          </p:txBody>
+        </p:sp>
+      </p:grpSp>
+      <p:sp>
+        <p:nvSpPr>
+          <p:cNvPr id="37" name="TextBox 36">
+            <a:extLst>
+              <a:ext uri="{FF2B5EF4-FFF2-40B4-BE49-F238E27FC236}">
+                <a16:creationId xmlns:a16="http://schemas.microsoft.com/office/drawing/2014/main" id="{9E10EF52-1C2E-4D3F-A621-D8B5376959A3}"/>
+              </a:ext>
+            </a:extLst>
+          </p:cNvPr>
+          <p:cNvSpPr txBox="1"/>
+          <p:nvPr/>
+        </p:nvSpPr>
+        <p:spPr>
+          <a:xfrm>
+            <a:off x="7730615" y="3772750"/>
+            <a:ext cx="947859" cy="584775"/>
+          </a:xfrm>
+          <a:prstGeom prst="rect">
+            <a:avLst/>
+          </a:prstGeom>
+          <a:noFill/>
+        </p:spPr>
+        <p:txBody>
+          <a:bodyPr wrap="square" rtlCol="0">
+            <a:spAutoFit/>
+          </a:bodyPr>
+          <a:lstStyle/>
+          <a:p>
+            <a:r>
+              <a:rPr lang="it-IT" sz="3200" dirty="0" err="1">
+                <a:latin typeface="Arial" panose="020B0604020202020204" pitchFamily="34" charset="0"/>
+                <a:cs typeface="Arial" panose="020B0604020202020204" pitchFamily="34" charset="0"/>
+              </a:rPr>
+              <a:t>wug</a:t>
+            </a:r>
+            <a:endParaRPr lang="en-GB" sz="3200" dirty="0">
+              <a:latin typeface="Arial" panose="020B0604020202020204" pitchFamily="34" charset="0"/>
+              <a:cs typeface="Arial" panose="020B0604020202020204" pitchFamily="34" charset="0"/>
+            </a:endParaRPr>
+          </a:p>
+        </p:txBody>
+      </p:sp>
+      <p:sp>
+        <p:nvSpPr>
+          <p:cNvPr id="38" name="Rectangle: Rounded Corners 37">
+            <a:extLst>
+              <a:ext uri="{FF2B5EF4-FFF2-40B4-BE49-F238E27FC236}">
+                <a16:creationId xmlns:a16="http://schemas.microsoft.com/office/drawing/2014/main" id="{307DEE5D-CB6C-4A0D-9681-E41B780B36DA}"/>
+              </a:ext>
+            </a:extLst>
+          </p:cNvPr>
+          <p:cNvSpPr/>
+          <p:nvPr/>
+        </p:nvSpPr>
+        <p:spPr>
+          <a:xfrm>
+            <a:off x="9823807" y="4221564"/>
+            <a:ext cx="1964957" cy="1568747"/>
+          </a:xfrm>
+          <a:prstGeom prst="roundRect">
+            <a:avLst/>
+          </a:prstGeom>
+          <a:solidFill>
+            <a:schemeClr val="bg1"/>
+          </a:solidFill>
+          <a:ln w="28575">
+            <a:solidFill>
+              <a:schemeClr val="tx1"/>
+            </a:solidFill>
+          </a:ln>
+        </p:spPr>
+        <p:style>
+          <a:lnRef idx="2">
+            <a:schemeClr val="accent1">
+              <a:shade val="50000"/>
+            </a:schemeClr>
+          </a:lnRef>
+          <a:fillRef idx="1">
+            <a:schemeClr val="accent1"/>
+          </a:fillRef>
+          <a:effectRef idx="0">
+            <a:schemeClr val="accent1"/>
+          </a:effectRef>
+          <a:fontRef idx="minor">
+            <a:schemeClr val="lt1"/>
+          </a:fontRef>
+        </p:style>
+        <p:txBody>
+          <a:bodyPr rtlCol="0" anchor="ctr"/>
+          <a:lstStyle/>
+          <a:p>
+            <a:pPr algn="ctr"/>
+            <a:endParaRPr lang="en-GB" sz="3200" dirty="0">
+              <a:solidFill>
+                <a:schemeClr val="tx1"/>
+              </a:solidFill>
+              <a:latin typeface="Arial" panose="020B0604020202020204" pitchFamily="34" charset="0"/>
+              <a:cs typeface="Arial" panose="020B0604020202020204" pitchFamily="34" charset="0"/>
+            </a:endParaRPr>
+          </a:p>
+        </p:txBody>
+      </p:sp>
+      <p:sp>
+        <p:nvSpPr>
+          <p:cNvPr id="42" name="TextBox 41">
+            <a:extLst>
+              <a:ext uri="{FF2B5EF4-FFF2-40B4-BE49-F238E27FC236}">
+                <a16:creationId xmlns:a16="http://schemas.microsoft.com/office/drawing/2014/main" id="{52BC60D0-2E2F-4733-9AE7-D4D33685F43D}"/>
+              </a:ext>
+            </a:extLst>
+          </p:cNvPr>
+          <p:cNvSpPr txBox="1"/>
+          <p:nvPr/>
+        </p:nvSpPr>
+        <p:spPr>
+          <a:xfrm>
+            <a:off x="8281327" y="1389795"/>
+            <a:ext cx="3783806" cy="830997"/>
+          </a:xfrm>
+          <a:prstGeom prst="rect">
+            <a:avLst/>
+          </a:prstGeom>
+          <a:noFill/>
+        </p:spPr>
+        <p:txBody>
+          <a:bodyPr wrap="square" rtlCol="0">
+            <a:spAutoFit/>
+          </a:bodyPr>
+          <a:lstStyle/>
+          <a:p>
+            <a:r>
+              <a:rPr lang="it-IT" sz="2400" i="1" dirty="0">
+                <a:latin typeface="Arial" panose="020B0604020202020204" pitchFamily="34" charset="0"/>
+                <a:cs typeface="Arial" panose="020B0604020202020204" pitchFamily="34" charset="0"/>
+              </a:rPr>
+              <a:t>«Select the </a:t>
+            </a:r>
+            <a:r>
+              <a:rPr lang="it-IT" sz="2400" b="1" i="1" dirty="0">
+                <a:latin typeface="Arial" panose="020B0604020202020204" pitchFamily="34" charset="0"/>
+                <a:cs typeface="Arial" panose="020B0604020202020204" pitchFamily="34" charset="0"/>
+              </a:rPr>
+              <a:t>label</a:t>
+            </a:r>
+            <a:r>
+              <a:rPr lang="it-IT" sz="2400" i="1" dirty="0">
+                <a:latin typeface="Arial" panose="020B0604020202020204" pitchFamily="34" charset="0"/>
+                <a:cs typeface="Arial" panose="020B0604020202020204" pitchFamily="34" charset="0"/>
+              </a:rPr>
+              <a:t> </a:t>
+            </a:r>
+            <a:r>
+              <a:rPr lang="it-IT" sz="2400" i="1" dirty="0" err="1">
+                <a:latin typeface="Arial" panose="020B0604020202020204" pitchFamily="34" charset="0"/>
+                <a:cs typeface="Arial" panose="020B0604020202020204" pitchFamily="34" charset="0"/>
+              </a:rPr>
+              <a:t>that</a:t>
+            </a:r>
+            <a:r>
+              <a:rPr lang="it-IT" sz="2400" i="1" dirty="0">
+                <a:latin typeface="Arial" panose="020B0604020202020204" pitchFamily="34" charset="0"/>
+                <a:cs typeface="Arial" panose="020B0604020202020204" pitchFamily="34" charset="0"/>
+              </a:rPr>
+              <a:t> best matches the </a:t>
+            </a:r>
+            <a:r>
+              <a:rPr lang="it-IT" sz="2400" b="1" i="1" dirty="0" err="1">
+                <a:latin typeface="Arial" panose="020B0604020202020204" pitchFamily="34" charset="0"/>
+                <a:cs typeface="Arial" panose="020B0604020202020204" pitchFamily="34" charset="0"/>
+              </a:rPr>
+              <a:t>fribble</a:t>
+            </a:r>
+            <a:r>
+              <a:rPr lang="it-IT" sz="2400" i="1" dirty="0">
+                <a:latin typeface="Arial" panose="020B0604020202020204" pitchFamily="34" charset="0"/>
+                <a:cs typeface="Arial" panose="020B0604020202020204" pitchFamily="34" charset="0"/>
+              </a:rPr>
+              <a:t>»</a:t>
+            </a:r>
+            <a:endParaRPr lang="en-GB" sz="2400" i="1" dirty="0">
+              <a:latin typeface="Arial" panose="020B0604020202020204" pitchFamily="34" charset="0"/>
+              <a:cs typeface="Arial" panose="020B0604020202020204" pitchFamily="34" charset="0"/>
+            </a:endParaRPr>
+          </a:p>
+        </p:txBody>
+      </p:sp>
+      <p:grpSp>
+        <p:nvGrpSpPr>
+          <p:cNvPr id="43" name="Gruppo 13">
+            <a:extLst>
+              <a:ext uri="{FF2B5EF4-FFF2-40B4-BE49-F238E27FC236}">
+                <a16:creationId xmlns:a16="http://schemas.microsoft.com/office/drawing/2014/main" id="{CF6EEA7D-331A-4331-89D3-4A0F7DA19AD4}"/>
+              </a:ext>
+            </a:extLst>
+          </p:cNvPr>
+          <p:cNvGrpSpPr/>
+          <p:nvPr/>
+        </p:nvGrpSpPr>
+        <p:grpSpPr>
+          <a:xfrm>
+            <a:off x="9012989" y="3440698"/>
+            <a:ext cx="534256" cy="485091"/>
+            <a:chOff x="439547" y="2285573"/>
+            <a:chExt cx="1136114" cy="1278743"/>
+          </a:xfrm>
+        </p:grpSpPr>
+        <p:sp>
+          <p:nvSpPr>
+            <p:cNvPr id="44" name="Suono 14">
+              <a:hlinkClick r:id="" action="ppaction://noaction" highlightClick="1"/>
+              <a:extLst>
+                <a:ext uri="{FF2B5EF4-FFF2-40B4-BE49-F238E27FC236}">
+                  <a16:creationId xmlns:a16="http://schemas.microsoft.com/office/drawing/2014/main" id="{3B4A4A29-9C70-49CF-841E-4766AA4AA24C}"/>
+                </a:ext>
+              </a:extLst>
+            </p:cNvPr>
+            <p:cNvSpPr/>
+            <p:nvPr/>
+          </p:nvSpPr>
+          <p:spPr>
+            <a:xfrm>
+              <a:off x="439547" y="2285573"/>
+              <a:ext cx="1136114" cy="1278743"/>
+            </a:xfrm>
+            <a:prstGeom prst="actionButtonSound">
+              <a:avLst/>
+            </a:prstGeom>
+            <a:noFill/>
+            <a:ln w="38100">
+              <a:solidFill>
+                <a:schemeClr val="tx1"/>
+              </a:solidFill>
+            </a:ln>
+          </p:spPr>
+          <p:style>
+            <a:lnRef idx="2">
+              <a:schemeClr val="accent1">
+                <a:shade val="50000"/>
+              </a:schemeClr>
+            </a:lnRef>
+            <a:fillRef idx="1">
+              <a:schemeClr val="accent1"/>
+            </a:fillRef>
+            <a:effectRef idx="0">
+              <a:schemeClr val="accent1"/>
+            </a:effectRef>
+            <a:fontRef idx="minor">
+              <a:schemeClr val="lt1"/>
+            </a:fontRef>
+          </p:style>
+          <p:txBody>
+            <a:bodyPr rtlCol="0" anchor="ctr"/>
+            <a:lstStyle/>
+            <a:p>
+              <a:pPr algn="ctr"/>
+              <a:endParaRPr lang="en-GB" dirty="0"/>
+            </a:p>
+          </p:txBody>
+        </p:sp>
+        <p:sp>
+          <p:nvSpPr>
+            <p:cNvPr id="45" name="Rettangolo 15">
+              <a:extLst>
+                <a:ext uri="{FF2B5EF4-FFF2-40B4-BE49-F238E27FC236}">
+                  <a16:creationId xmlns:a16="http://schemas.microsoft.com/office/drawing/2014/main" id="{AAB8BB7E-74C0-4146-B857-C48EEB12478A}"/>
+                </a:ext>
+              </a:extLst>
+            </p:cNvPr>
+            <p:cNvSpPr/>
+            <p:nvPr/>
+          </p:nvSpPr>
+          <p:spPr>
+            <a:xfrm>
+              <a:off x="439547" y="2285573"/>
+              <a:ext cx="1136114" cy="1278743"/>
+            </a:xfrm>
+            <a:prstGeom prst="rect">
+              <a:avLst/>
+            </a:prstGeom>
+            <a:noFill/>
+            <a:ln w="38100">
+              <a:solidFill>
+                <a:schemeClr val="bg1"/>
+              </a:solidFill>
+            </a:ln>
+          </p:spPr>
+          <p:style>
+            <a:lnRef idx="2">
+              <a:schemeClr val="accent1">
+                <a:shade val="50000"/>
+              </a:schemeClr>
+            </a:lnRef>
+            <a:fillRef idx="1">
+              <a:schemeClr val="accent1"/>
+            </a:fillRef>
+            <a:effectRef idx="0">
+              <a:schemeClr val="accent1"/>
+            </a:effectRef>
+            <a:fontRef idx="minor">
+              <a:schemeClr val="lt1"/>
+            </a:fontRef>
+          </p:style>
+          <p:txBody>
+            <a:bodyPr rtlCol="0" anchor="ctr"/>
+            <a:lstStyle/>
+            <a:p>
+              <a:pPr algn="ctr"/>
+              <a:endParaRPr lang="en-GB"/>
+            </a:p>
+          </p:txBody>
+        </p:sp>
+      </p:grpSp>
+      <p:grpSp>
+        <p:nvGrpSpPr>
+          <p:cNvPr id="46" name="Gruppo 13">
+            <a:extLst>
+              <a:ext uri="{FF2B5EF4-FFF2-40B4-BE49-F238E27FC236}">
+                <a16:creationId xmlns:a16="http://schemas.microsoft.com/office/drawing/2014/main" id="{C9D6BBE6-DA44-4BDD-8F23-E30416D2D011}"/>
+              </a:ext>
+            </a:extLst>
+          </p:cNvPr>
+          <p:cNvGrpSpPr/>
+          <p:nvPr/>
+        </p:nvGrpSpPr>
+        <p:grpSpPr>
+          <a:xfrm>
+            <a:off x="9925676" y="3449262"/>
+            <a:ext cx="534256" cy="485091"/>
+            <a:chOff x="439547" y="2285573"/>
+            <a:chExt cx="1136114" cy="1278743"/>
+          </a:xfrm>
+        </p:grpSpPr>
+        <p:sp>
+          <p:nvSpPr>
+            <p:cNvPr id="47" name="Suono 14">
+              <a:hlinkClick r:id="" action="ppaction://noaction" highlightClick="1"/>
+              <a:extLst>
+                <a:ext uri="{FF2B5EF4-FFF2-40B4-BE49-F238E27FC236}">
+                  <a16:creationId xmlns:a16="http://schemas.microsoft.com/office/drawing/2014/main" id="{67968ACD-261C-46A8-87ED-A13CCF88CF1E}"/>
+                </a:ext>
+              </a:extLst>
+            </p:cNvPr>
+            <p:cNvSpPr/>
+            <p:nvPr/>
+          </p:nvSpPr>
+          <p:spPr>
+            <a:xfrm>
+              <a:off x="439547" y="2285573"/>
+              <a:ext cx="1136114" cy="1278743"/>
+            </a:xfrm>
+            <a:prstGeom prst="actionButtonSound">
+              <a:avLst/>
+            </a:prstGeom>
+            <a:noFill/>
+            <a:ln w="38100">
+              <a:solidFill>
+                <a:schemeClr val="tx1"/>
+              </a:solidFill>
+            </a:ln>
+          </p:spPr>
+          <p:style>
+            <a:lnRef idx="2">
+              <a:schemeClr val="accent1">
+                <a:shade val="50000"/>
+              </a:schemeClr>
+            </a:lnRef>
+            <a:fillRef idx="1">
+              <a:schemeClr val="accent1"/>
+            </a:fillRef>
+            <a:effectRef idx="0">
+              <a:schemeClr val="accent1"/>
+            </a:effectRef>
+            <a:fontRef idx="minor">
+              <a:schemeClr val="lt1"/>
+            </a:fontRef>
+          </p:style>
+          <p:txBody>
+            <a:bodyPr rtlCol="0" anchor="ctr"/>
+            <a:lstStyle/>
+            <a:p>
+              <a:pPr algn="ctr"/>
+              <a:endParaRPr lang="en-GB" dirty="0"/>
+            </a:p>
+          </p:txBody>
+        </p:sp>
+        <p:sp>
+          <p:nvSpPr>
+            <p:cNvPr id="48" name="Rettangolo 15">
+              <a:extLst>
+                <a:ext uri="{FF2B5EF4-FFF2-40B4-BE49-F238E27FC236}">
+                  <a16:creationId xmlns:a16="http://schemas.microsoft.com/office/drawing/2014/main" id="{24D2D3D6-19DC-44A5-8F17-D2E6D9C137DA}"/>
+                </a:ext>
+              </a:extLst>
+            </p:cNvPr>
+            <p:cNvSpPr/>
+            <p:nvPr/>
+          </p:nvSpPr>
+          <p:spPr>
+            <a:xfrm>
+              <a:off x="439547" y="2285573"/>
+              <a:ext cx="1136114" cy="1278743"/>
+            </a:xfrm>
+            <a:prstGeom prst="rect">
+              <a:avLst/>
+            </a:prstGeom>
+            <a:noFill/>
+            <a:ln w="38100">
+              <a:solidFill>
+                <a:schemeClr val="bg1"/>
+              </a:solidFill>
+            </a:ln>
+          </p:spPr>
+          <p:style>
+            <a:lnRef idx="2">
+              <a:schemeClr val="accent1">
+                <a:shade val="50000"/>
+              </a:schemeClr>
+            </a:lnRef>
+            <a:fillRef idx="1">
+              <a:schemeClr val="accent1"/>
+            </a:fillRef>
+            <a:effectRef idx="0">
+              <a:schemeClr val="accent1"/>
+            </a:effectRef>
+            <a:fontRef idx="minor">
+              <a:schemeClr val="lt1"/>
+            </a:fontRef>
+          </p:style>
+          <p:txBody>
+            <a:bodyPr rtlCol="0" anchor="ctr"/>
+            <a:lstStyle/>
+            <a:p>
+              <a:pPr algn="ctr"/>
+              <a:endParaRPr lang="en-GB"/>
+            </a:p>
+          </p:txBody>
+        </p:sp>
+      </p:grpSp>
+      <p:sp>
+        <p:nvSpPr>
+          <p:cNvPr id="49" name="TextBox 48">
+            <a:extLst>
+              <a:ext uri="{FF2B5EF4-FFF2-40B4-BE49-F238E27FC236}">
+                <a16:creationId xmlns:a16="http://schemas.microsoft.com/office/drawing/2014/main" id="{BA6C35AD-BDB9-4A30-AB8F-2453109DAA82}"/>
+              </a:ext>
+            </a:extLst>
+          </p:cNvPr>
+          <p:cNvSpPr txBox="1"/>
+          <p:nvPr/>
+        </p:nvSpPr>
+        <p:spPr>
+          <a:xfrm>
+            <a:off x="8910773" y="3787242"/>
+            <a:ext cx="947859" cy="584775"/>
+          </a:xfrm>
+          <a:prstGeom prst="rect">
+            <a:avLst/>
+          </a:prstGeom>
+          <a:noFill/>
+        </p:spPr>
+        <p:txBody>
+          <a:bodyPr wrap="square" rtlCol="0">
+            <a:spAutoFit/>
+          </a:bodyPr>
+          <a:lstStyle/>
+          <a:p>
+            <a:r>
+              <a:rPr lang="it-IT" sz="3200" dirty="0" err="1">
+                <a:latin typeface="Arial" panose="020B0604020202020204" pitchFamily="34" charset="0"/>
+                <a:cs typeface="Arial" panose="020B0604020202020204" pitchFamily="34" charset="0"/>
+              </a:rPr>
+              <a:t>tob</a:t>
+            </a:r>
+            <a:endParaRPr lang="en-GB" sz="3200" dirty="0">
+              <a:latin typeface="Arial" panose="020B0604020202020204" pitchFamily="34" charset="0"/>
+              <a:cs typeface="Arial" panose="020B0604020202020204" pitchFamily="34" charset="0"/>
+            </a:endParaRPr>
+          </a:p>
+        </p:txBody>
+      </p:sp>
+      <p:sp>
+        <p:nvSpPr>
+          <p:cNvPr id="50" name="TextBox 49">
+            <a:extLst>
+              <a:ext uri="{FF2B5EF4-FFF2-40B4-BE49-F238E27FC236}">
+                <a16:creationId xmlns:a16="http://schemas.microsoft.com/office/drawing/2014/main" id="{7886B644-3652-4FCA-AA75-92C9AA4CA565}"/>
+              </a:ext>
+            </a:extLst>
+          </p:cNvPr>
+          <p:cNvSpPr txBox="1"/>
+          <p:nvPr/>
+        </p:nvSpPr>
+        <p:spPr>
+          <a:xfrm>
+            <a:off x="9854286" y="3775258"/>
+            <a:ext cx="947859" cy="584775"/>
+          </a:xfrm>
+          <a:prstGeom prst="rect">
+            <a:avLst/>
+          </a:prstGeom>
+          <a:noFill/>
+        </p:spPr>
+        <p:txBody>
+          <a:bodyPr wrap="square" rtlCol="0">
+            <a:spAutoFit/>
+          </a:bodyPr>
+          <a:lstStyle/>
+          <a:p>
+            <a:r>
+              <a:rPr lang="it-IT" sz="3200" dirty="0" err="1">
+                <a:latin typeface="Arial" panose="020B0604020202020204" pitchFamily="34" charset="0"/>
+                <a:cs typeface="Arial" panose="020B0604020202020204" pitchFamily="34" charset="0"/>
+              </a:rPr>
+              <a:t>dep</a:t>
+            </a:r>
+            <a:endParaRPr lang="en-GB" sz="3200" dirty="0">
+              <a:latin typeface="Arial" panose="020B0604020202020204" pitchFamily="34" charset="0"/>
+              <a:cs typeface="Arial" panose="020B0604020202020204" pitchFamily="34" charset="0"/>
+            </a:endParaRPr>
+          </a:p>
+        </p:txBody>
+      </p:sp>
+      <p:pic>
+        <p:nvPicPr>
+          <p:cNvPr id="7" name="Picture 6">
+            <a:extLst>
+              <a:ext uri="{FF2B5EF4-FFF2-40B4-BE49-F238E27FC236}">
+                <a16:creationId xmlns:a16="http://schemas.microsoft.com/office/drawing/2014/main" id="{65E5811E-647F-400E-B752-C634A84EFD82}"/>
+              </a:ext>
+            </a:extLst>
+          </p:cNvPr>
+          <p:cNvPicPr>
+            <a:picLocks noChangeAspect="1"/>
+          </p:cNvPicPr>
+          <p:nvPr/>
+        </p:nvPicPr>
+        <p:blipFill rotWithShape="1">
+          <a:blip r:embed="rId2"/>
+          <a:srcRect t="6575"/>
+          <a:stretch/>
+        </p:blipFill>
+        <p:spPr>
+          <a:xfrm>
+            <a:off x="1944246" y="3145511"/>
+            <a:ext cx="1085906" cy="818725"/>
+          </a:xfrm>
+          <a:prstGeom prst="rect">
+            <a:avLst/>
+          </a:prstGeom>
+        </p:spPr>
+      </p:pic>
+      <p:pic>
+        <p:nvPicPr>
+          <p:cNvPr id="19" name="Picture 18">
+            <a:extLst>
+              <a:ext uri="{FF2B5EF4-FFF2-40B4-BE49-F238E27FC236}">
+                <a16:creationId xmlns:a16="http://schemas.microsoft.com/office/drawing/2014/main" id="{9404F4C4-5D5A-429F-87BD-76AB8D735458}"/>
+              </a:ext>
+            </a:extLst>
+          </p:cNvPr>
+          <p:cNvPicPr>
+            <a:picLocks noChangeAspect="1"/>
+          </p:cNvPicPr>
+          <p:nvPr/>
+        </p:nvPicPr>
+        <p:blipFill>
+          <a:blip r:embed="rId3"/>
+          <a:stretch>
+            <a:fillRect/>
+          </a:stretch>
+        </p:blipFill>
+        <p:spPr>
+          <a:xfrm>
+            <a:off x="8623523" y="2525459"/>
+            <a:ext cx="1130358" cy="977131"/>
+          </a:xfrm>
+          <a:prstGeom prst="rect">
+            <a:avLst/>
+          </a:prstGeom>
+        </p:spPr>
+      </p:pic>
+      <p:pic>
+        <p:nvPicPr>
+          <p:cNvPr id="51" name="Picture 50">
+            <a:extLst>
+              <a:ext uri="{FF2B5EF4-FFF2-40B4-BE49-F238E27FC236}">
+                <a16:creationId xmlns:a16="http://schemas.microsoft.com/office/drawing/2014/main" id="{FCF89B98-1FD4-4D1F-81AB-28F856C35BE4}"/>
+              </a:ext>
+            </a:extLst>
+          </p:cNvPr>
+          <p:cNvPicPr>
+            <a:picLocks noChangeAspect="1"/>
+          </p:cNvPicPr>
+          <p:nvPr/>
+        </p:nvPicPr>
+        <p:blipFill>
+          <a:blip r:embed="rId3"/>
+          <a:stretch>
+            <a:fillRect/>
+          </a:stretch>
+        </p:blipFill>
+        <p:spPr>
+          <a:xfrm>
+            <a:off x="3848623" y="2977352"/>
+            <a:ext cx="1130358" cy="977131"/>
+          </a:xfrm>
+          <a:prstGeom prst="rect">
+            <a:avLst/>
+          </a:prstGeom>
+        </p:spPr>
+      </p:pic>
+      <p:pic>
+        <p:nvPicPr>
+          <p:cNvPr id="20" name="Picture 19">
+            <a:extLst>
+              <a:ext uri="{FF2B5EF4-FFF2-40B4-BE49-F238E27FC236}">
+                <a16:creationId xmlns:a16="http://schemas.microsoft.com/office/drawing/2014/main" id="{1E0C139C-63AB-44DD-A5AB-91EDAB93AE62}"/>
+              </a:ext>
+            </a:extLst>
+          </p:cNvPr>
+          <p:cNvPicPr>
+            <a:picLocks noChangeAspect="1"/>
+          </p:cNvPicPr>
+          <p:nvPr/>
+        </p:nvPicPr>
+        <p:blipFill>
+          <a:blip r:embed="rId4"/>
+          <a:stretch>
+            <a:fillRect/>
+          </a:stretch>
+        </p:blipFill>
+        <p:spPr>
+          <a:xfrm>
+            <a:off x="2920700" y="3061785"/>
+            <a:ext cx="1054154" cy="1003352"/>
+          </a:xfrm>
+          <a:prstGeom prst="rect">
+            <a:avLst/>
+          </a:prstGeom>
+        </p:spPr>
+      </p:pic>
+    </p:spTree>
+    <p:extLst>
+      <p:ext uri="{BB962C8B-B14F-4D97-AF65-F5344CB8AC3E}">
+        <p14:creationId xmlns:p14="http://schemas.microsoft.com/office/powerpoint/2010/main" val="1693330943"/>
+      </p:ext>
+    </p:extLst>
+  </p:cSld>
+  <p:clrMapOvr>
+    <a:masterClrMapping/>
+  </p:clrMapOvr>
+</p:sld>
+</file>
+
+<file path=ppt/slides/slide4.xml><?xml version="1.0" encoding="utf-8"?>
+<p:sld xmlns:a="http://schemas.openxmlformats.org/drawingml/2006/main" xmlns:r="http://schemas.openxmlformats.org/officeDocument/2006/relationships" xmlns:p="http://schemas.openxmlformats.org/presentationml/2006/main">
+  <p:cSld>
+    <p:spTree>
+      <p:nvGrpSpPr>
+        <p:cNvPr id="1" name=""/>
+        <p:cNvGrpSpPr/>
+        <p:nvPr/>
+      </p:nvGrpSpPr>
+      <p:grpSpPr>
+        <a:xfrm>
+          <a:off x="0" y="0"/>
+          <a:ext cx="0" cy="0"/>
+          <a:chOff x="0" y="0"/>
+          <a:chExt cx="0" cy="0"/>
+        </a:xfrm>
+      </p:grpSpPr>
+      <p:sp>
+        <p:nvSpPr>
+          <p:cNvPr id="4" name="TextBox 3">
+            <a:extLst>
+              <a:ext uri="{FF2B5EF4-FFF2-40B4-BE49-F238E27FC236}">
+                <a16:creationId xmlns:a16="http://schemas.microsoft.com/office/drawing/2014/main" id="{97ADA43C-E64E-4A7A-A395-958080FF3B7C}"/>
+              </a:ext>
+            </a:extLst>
+          </p:cNvPr>
+          <p:cNvSpPr txBox="1"/>
+          <p:nvPr/>
+        </p:nvSpPr>
+        <p:spPr>
+          <a:xfrm>
+            <a:off x="2532818" y="131021"/>
+            <a:ext cx="6858000" cy="584775"/>
+          </a:xfrm>
+          <a:prstGeom prst="rect">
+            <a:avLst/>
+          </a:prstGeom>
+          <a:noFill/>
+        </p:spPr>
+        <p:txBody>
+          <a:bodyPr wrap="square" rtlCol="0">
+            <a:spAutoFit/>
+          </a:bodyPr>
+          <a:lstStyle/>
+          <a:p>
+            <a:pPr algn="ctr"/>
+            <a:r>
+              <a:rPr lang="it-IT" sz="3200" dirty="0" err="1">
+                <a:latin typeface="Arial" panose="020B0604020202020204" pitchFamily="34" charset="0"/>
+                <a:cs typeface="Arial" panose="020B0604020202020204" pitchFamily="34" charset="0"/>
+              </a:rPr>
+              <a:t>Magnitude</a:t>
+            </a:r>
+            <a:r>
+              <a:rPr lang="it-IT" sz="3200" dirty="0">
+                <a:latin typeface="Arial" panose="020B0604020202020204" pitchFamily="34" charset="0"/>
+                <a:cs typeface="Arial" panose="020B0604020202020204" pitchFamily="34" charset="0"/>
+              </a:rPr>
+              <a:t> </a:t>
+            </a:r>
+            <a:r>
+              <a:rPr lang="it-IT" sz="3200" dirty="0" err="1">
+                <a:latin typeface="Arial" panose="020B0604020202020204" pitchFamily="34" charset="0"/>
+                <a:cs typeface="Arial" panose="020B0604020202020204" pitchFamily="34" charset="0"/>
+              </a:rPr>
+              <a:t>estimation</a:t>
+            </a:r>
+            <a:r>
+              <a:rPr lang="it-IT" sz="3200" dirty="0">
+                <a:latin typeface="Arial" panose="020B0604020202020204" pitchFamily="34" charset="0"/>
+                <a:cs typeface="Arial" panose="020B0604020202020204" pitchFamily="34" charset="0"/>
+              </a:rPr>
+              <a:t> task</a:t>
+            </a:r>
+            <a:endParaRPr lang="en-GB" sz="3200" dirty="0">
+              <a:latin typeface="Arial" panose="020B0604020202020204" pitchFamily="34" charset="0"/>
+              <a:cs typeface="Arial" panose="020B0604020202020204" pitchFamily="34" charset="0"/>
+            </a:endParaRPr>
+          </a:p>
+        </p:txBody>
+      </p:sp>
+      <p:sp>
+        <p:nvSpPr>
+          <p:cNvPr id="13" name="CasellaDiTesto 28">
+            <a:extLst>
+              <a:ext uri="{FF2B5EF4-FFF2-40B4-BE49-F238E27FC236}">
+                <a16:creationId xmlns:a16="http://schemas.microsoft.com/office/drawing/2014/main" id="{A07B1D01-78C2-4943-B2B5-6EAC29CBD878}"/>
+              </a:ext>
+            </a:extLst>
+          </p:cNvPr>
+          <p:cNvSpPr txBox="1"/>
+          <p:nvPr/>
+        </p:nvSpPr>
+        <p:spPr>
+          <a:xfrm>
+            <a:off x="5898483" y="4186741"/>
+            <a:ext cx="1293558" cy="400110"/>
+          </a:xfrm>
+          <a:prstGeom prst="rect">
+            <a:avLst/>
+          </a:prstGeom>
+          <a:noFill/>
+        </p:spPr>
+        <p:txBody>
+          <a:bodyPr wrap="square" rtlCol="0">
+            <a:spAutoFit/>
+          </a:bodyPr>
+          <a:lstStyle/>
+          <a:p>
+            <a:r>
+              <a:rPr lang="en-GB" sz="2000" dirty="0">
+                <a:latin typeface="Arial" panose="020B0604020202020204" pitchFamily="34" charset="0"/>
+                <a:cs typeface="Arial" panose="020B0604020202020204" pitchFamily="34" charset="0"/>
+              </a:rPr>
+              <a:t>200 </a:t>
             </a:r>
             <a:r>
               <a:rPr lang="en-GB" sz="2000" dirty="0" err="1">

</xml_diff>